<commit_message>
Documents for 30% ready.
</commit_message>
<xml_diff>
--- a/docs/30%-presentation/software-documents/Liver Tumor Segmentation Model.pptx
+++ b/docs/30%-presentation/software-documents/Liver Tumor Segmentation Model.pptx
@@ -5,7 +5,7 @@
     <p:sldMasterId id="2147483648" r:id="rId1"/>
   </p:sldMasterIdLst>
   <p:notesMasterIdLst>
-    <p:notesMasterId r:id="rId20"/>
+    <p:notesMasterId r:id="rId19"/>
   </p:notesMasterIdLst>
   <p:sldIdLst>
     <p:sldId id="256" r:id="rId2"/>
@@ -19,13 +19,12 @@
     <p:sldId id="265" r:id="rId10"/>
     <p:sldId id="266" r:id="rId11"/>
     <p:sldId id="267" r:id="rId12"/>
-    <p:sldId id="275" r:id="rId13"/>
-    <p:sldId id="276" r:id="rId14"/>
-    <p:sldId id="277" r:id="rId15"/>
-    <p:sldId id="268" r:id="rId16"/>
-    <p:sldId id="270" r:id="rId17"/>
-    <p:sldId id="278" r:id="rId18"/>
-    <p:sldId id="269" r:id="rId19"/>
+    <p:sldId id="280" r:id="rId13"/>
+    <p:sldId id="281" r:id="rId14"/>
+    <p:sldId id="268" r:id="rId15"/>
+    <p:sldId id="270" r:id="rId16"/>
+    <p:sldId id="278" r:id="rId17"/>
+    <p:sldId id="269" r:id="rId18"/>
   </p:sldIdLst>
   <p:sldSz cx="9144000" cy="6858000" type="screen4x3"/>
   <p:notesSz cx="6858000" cy="9144000"/>
@@ -226,7 +225,7 @@
             <a:fld id="{C2B86B37-9E7C-4699-A89E-72EE4B291650}" type="datetimeFigureOut">
               <a:rPr lang="en-US" smtClean="0"/>
               <a:pPr/>
-              <a:t>12/29/2024</a:t>
+              <a:t>12/31/2024</a:t>
             </a:fld>
             <a:endParaRPr lang="en-US"/>
           </a:p>
@@ -676,7 +675,7 @@
             <a:fld id="{7BE7D89F-69BA-45D8-85C1-789124DFB921}" type="datetime1">
               <a:rPr lang="en-US" smtClean="0"/>
               <a:pPr/>
-              <a:t>12/29/2024</a:t>
+              <a:t>12/31/2024</a:t>
             </a:fld>
             <a:endParaRPr lang="en-US"/>
           </a:p>
@@ -841,7 +840,7 @@
             <a:fld id="{C5641830-9FBF-4C58-837A-230882702FD4}" type="datetime1">
               <a:rPr lang="en-US" smtClean="0"/>
               <a:pPr/>
-              <a:t>12/29/2024</a:t>
+              <a:t>12/31/2024</a:t>
             </a:fld>
             <a:endParaRPr lang="en-US"/>
           </a:p>
@@ -1016,7 +1015,7 @@
             <a:fld id="{691B8442-52C5-4632-BA82-04F7AD4C9B34}" type="datetime1">
               <a:rPr lang="en-US" smtClean="0"/>
               <a:pPr/>
-              <a:t>12/29/2024</a:t>
+              <a:t>12/31/2024</a:t>
             </a:fld>
             <a:endParaRPr lang="en-US"/>
           </a:p>
@@ -1181,7 +1180,7 @@
             <a:fld id="{E2F83749-7540-4838-B5FB-EDC40CB84DB0}" type="datetime1">
               <a:rPr lang="en-US" smtClean="0"/>
               <a:pPr/>
-              <a:t>12/29/2024</a:t>
+              <a:t>12/31/2024</a:t>
             </a:fld>
             <a:endParaRPr lang="en-US"/>
           </a:p>
@@ -1423,7 +1422,7 @@
             <a:fld id="{781A8085-18D1-4091-8AD3-81F140965EFC}" type="datetime1">
               <a:rPr lang="en-US" smtClean="0"/>
               <a:pPr/>
-              <a:t>12/29/2024</a:t>
+              <a:t>12/31/2024</a:t>
             </a:fld>
             <a:endParaRPr lang="en-US"/>
           </a:p>
@@ -1705,7 +1704,7 @@
             <a:fld id="{EACD35F7-97F8-4D2E-B83D-158766068E0A}" type="datetime1">
               <a:rPr lang="en-US" smtClean="0"/>
               <a:pPr/>
-              <a:t>12/29/2024</a:t>
+              <a:t>12/31/2024</a:t>
             </a:fld>
             <a:endParaRPr lang="en-US"/>
           </a:p>
@@ -2121,7 +2120,7 @@
             <a:fld id="{203EFADE-B1F7-484F-89D9-3E148D53B52B}" type="datetime1">
               <a:rPr lang="en-US" smtClean="0"/>
               <a:pPr/>
-              <a:t>12/29/2024</a:t>
+              <a:t>12/31/2024</a:t>
             </a:fld>
             <a:endParaRPr lang="en-US"/>
           </a:p>
@@ -2235,7 +2234,7 @@
             <a:fld id="{F09F378E-9541-4F7D-BD6F-302448FBBB81}" type="datetime1">
               <a:rPr lang="en-US" smtClean="0"/>
               <a:pPr/>
-              <a:t>12/29/2024</a:t>
+              <a:t>12/31/2024</a:t>
             </a:fld>
             <a:endParaRPr lang="en-US"/>
           </a:p>
@@ -2327,7 +2326,7 @@
             <a:fld id="{7E26370F-658E-452B-A4D5-DB4240E0AF51}" type="datetime1">
               <a:rPr lang="en-US" smtClean="0"/>
               <a:pPr/>
-              <a:t>12/29/2024</a:t>
+              <a:t>12/31/2024</a:t>
             </a:fld>
             <a:endParaRPr lang="en-US"/>
           </a:p>
@@ -2599,7 +2598,7 @@
             <a:fld id="{DC18E6F0-0C4F-4052-A284-495110A822E2}" type="datetime1">
               <a:rPr lang="en-US" smtClean="0"/>
               <a:pPr/>
-              <a:t>12/29/2024</a:t>
+              <a:t>12/31/2024</a:t>
             </a:fld>
             <a:endParaRPr lang="en-US"/>
           </a:p>
@@ -2848,7 +2847,7 @@
             <a:fld id="{1E4C22A7-5E39-4CEE-A6B3-52DA5303DD53}" type="datetime1">
               <a:rPr lang="en-US" smtClean="0"/>
               <a:pPr/>
-              <a:t>12/29/2024</a:t>
+              <a:t>12/31/2024</a:t>
             </a:fld>
             <a:endParaRPr lang="en-US"/>
           </a:p>
@@ -3056,7 +3055,7 @@
             <a:fld id="{568188C4-8F03-4988-A683-AFCBDCFC6ED7}" type="datetime1">
               <a:rPr lang="en-US" smtClean="0"/>
               <a:pPr/>
-              <a:t>12/29/2024</a:t>
+              <a:t>12/31/2024</a:t>
             </a:fld>
             <a:endParaRPr lang="en-US"/>
           </a:p>
@@ -3438,7 +3437,12 @@
             <p:ph type="ctrTitle"/>
           </p:nvPr>
         </p:nvSpPr>
-        <p:spPr/>
+        <p:spPr>
+          <a:xfrm>
+            <a:off x="685800" y="1425247"/>
+            <a:ext cx="7772400" cy="1470025"/>
+          </a:xfrm>
+        </p:spPr>
         <p:txBody>
           <a:bodyPr/>
           <a:lstStyle/>
@@ -3465,7 +3469,7 @@
         </p:nvSpPr>
         <p:spPr>
           <a:xfrm>
-            <a:off x="1371600" y="3660120"/>
+            <a:off x="1371600" y="3376121"/>
             <a:ext cx="6400800" cy="1369080"/>
           </a:xfrm>
         </p:spPr>
@@ -3698,169 +3702,6 @@
               <a:latin typeface="Times New Roman" panose="02020603050405020304" pitchFamily="18" charset="0"/>
               <a:cs typeface="Times New Roman" panose="02020603050405020304" pitchFamily="18" charset="0"/>
             </a:endParaRPr>
-          </a:p>
-        </p:txBody>
-      </p:sp>
-      <p:sp>
-        <p:nvSpPr>
-          <p:cNvPr id="7" name="TextBox 1"/>
-          <p:cNvSpPr txBox="1">
-            <a:spLocks noChangeArrowheads="1"/>
-          </p:cNvSpPr>
-          <p:nvPr/>
-        </p:nvSpPr>
-        <p:spPr bwMode="auto">
-          <a:xfrm>
-            <a:off x="1066800" y="381000"/>
-            <a:ext cx="6858000" cy="523220"/>
-          </a:xfrm>
-          <a:prstGeom prst="rect">
-            <a:avLst/>
-          </a:prstGeom>
-          <a:noFill/>
-          <a:ln>
-            <a:noFill/>
-          </a:ln>
-          <a:extLst>
-            <a:ext uri="{909E8E84-426E-40DD-AFC4-6F175D3DCCD1}">
-              <a14:hiddenFill xmlns:a14="http://schemas.microsoft.com/office/drawing/2010/main">
-                <a:solidFill>
-                  <a:srgbClr val="FFFFFF"/>
-                </a:solidFill>
-              </a14:hiddenFill>
-            </a:ext>
-            <a:ext uri="{91240B29-F687-4F45-9708-019B960494DF}">
-              <a14:hiddenLine xmlns:a14="http://schemas.microsoft.com/office/drawing/2010/main" w="9525">
-                <a:solidFill>
-                  <a:srgbClr val="000000"/>
-                </a:solidFill>
-                <a:miter lim="800000"/>
-                <a:headEnd/>
-                <a:tailEnd/>
-              </a14:hiddenLine>
-            </a:ext>
-          </a:extLst>
-        </p:spPr>
-        <p:txBody>
-          <a:bodyPr wrap="square">
-            <a:spAutoFit/>
-          </a:bodyPr>
-          <a:lstStyle>
-            <a:lvl1pPr>
-              <a:defRPr>
-                <a:solidFill>
-                  <a:schemeClr val="tx1"/>
-                </a:solidFill>
-                <a:latin typeface="Arial" panose="020B0604020202020204" pitchFamily="34" charset="0"/>
-                <a:cs typeface="Arial" panose="020B0604020202020204" pitchFamily="34" charset="0"/>
-              </a:defRPr>
-            </a:lvl1pPr>
-            <a:lvl2pPr marL="742950" indent="-285750">
-              <a:defRPr>
-                <a:solidFill>
-                  <a:schemeClr val="tx1"/>
-                </a:solidFill>
-                <a:latin typeface="Arial" panose="020B0604020202020204" pitchFamily="34" charset="0"/>
-                <a:cs typeface="Arial" panose="020B0604020202020204" pitchFamily="34" charset="0"/>
-              </a:defRPr>
-            </a:lvl2pPr>
-            <a:lvl3pPr marL="1143000" indent="-228600">
-              <a:defRPr>
-                <a:solidFill>
-                  <a:schemeClr val="tx1"/>
-                </a:solidFill>
-                <a:latin typeface="Arial" panose="020B0604020202020204" pitchFamily="34" charset="0"/>
-                <a:cs typeface="Arial" panose="020B0604020202020204" pitchFamily="34" charset="0"/>
-              </a:defRPr>
-            </a:lvl3pPr>
-            <a:lvl4pPr marL="1600200" indent="-228600">
-              <a:defRPr>
-                <a:solidFill>
-                  <a:schemeClr val="tx1"/>
-                </a:solidFill>
-                <a:latin typeface="Arial" panose="020B0604020202020204" pitchFamily="34" charset="0"/>
-                <a:cs typeface="Arial" panose="020B0604020202020204" pitchFamily="34" charset="0"/>
-              </a:defRPr>
-            </a:lvl4pPr>
-            <a:lvl5pPr marL="2057400" indent="-228600">
-              <a:defRPr>
-                <a:solidFill>
-                  <a:schemeClr val="tx1"/>
-                </a:solidFill>
-                <a:latin typeface="Arial" panose="020B0604020202020204" pitchFamily="34" charset="0"/>
-                <a:cs typeface="Arial" panose="020B0604020202020204" pitchFamily="34" charset="0"/>
-              </a:defRPr>
-            </a:lvl5pPr>
-            <a:lvl6pPr marL="2514600" indent="-228600" eaLnBrk="0" fontAlgn="base" hangingPunct="0">
-              <a:spcBef>
-                <a:spcPct val="0"/>
-              </a:spcBef>
-              <a:spcAft>
-                <a:spcPct val="0"/>
-              </a:spcAft>
-              <a:defRPr>
-                <a:solidFill>
-                  <a:schemeClr val="tx1"/>
-                </a:solidFill>
-                <a:latin typeface="Arial" panose="020B0604020202020204" pitchFamily="34" charset="0"/>
-                <a:cs typeface="Arial" panose="020B0604020202020204" pitchFamily="34" charset="0"/>
-              </a:defRPr>
-            </a:lvl6pPr>
-            <a:lvl7pPr marL="2971800" indent="-228600" eaLnBrk="0" fontAlgn="base" hangingPunct="0">
-              <a:spcBef>
-                <a:spcPct val="0"/>
-              </a:spcBef>
-              <a:spcAft>
-                <a:spcPct val="0"/>
-              </a:spcAft>
-              <a:defRPr>
-                <a:solidFill>
-                  <a:schemeClr val="tx1"/>
-                </a:solidFill>
-                <a:latin typeface="Arial" panose="020B0604020202020204" pitchFamily="34" charset="0"/>
-                <a:cs typeface="Arial" panose="020B0604020202020204" pitchFamily="34" charset="0"/>
-              </a:defRPr>
-            </a:lvl7pPr>
-            <a:lvl8pPr marL="3429000" indent="-228600" eaLnBrk="0" fontAlgn="base" hangingPunct="0">
-              <a:spcBef>
-                <a:spcPct val="0"/>
-              </a:spcBef>
-              <a:spcAft>
-                <a:spcPct val="0"/>
-              </a:spcAft>
-              <a:defRPr>
-                <a:solidFill>
-                  <a:schemeClr val="tx1"/>
-                </a:solidFill>
-                <a:latin typeface="Arial" panose="020B0604020202020204" pitchFamily="34" charset="0"/>
-                <a:cs typeface="Arial" panose="020B0604020202020204" pitchFamily="34" charset="0"/>
-              </a:defRPr>
-            </a:lvl8pPr>
-            <a:lvl9pPr marL="3886200" indent="-228600" eaLnBrk="0" fontAlgn="base" hangingPunct="0">
-              <a:spcBef>
-                <a:spcPct val="0"/>
-              </a:spcBef>
-              <a:spcAft>
-                <a:spcPct val="0"/>
-              </a:spcAft>
-              <a:defRPr>
-                <a:solidFill>
-                  <a:schemeClr val="tx1"/>
-                </a:solidFill>
-                <a:latin typeface="Arial" panose="020B0604020202020204" pitchFamily="34" charset="0"/>
-                <a:cs typeface="Arial" panose="020B0604020202020204" pitchFamily="34" charset="0"/>
-              </a:defRPr>
-            </a:lvl9pPr>
-          </a:lstStyle>
-          <a:p>
-            <a:pPr algn="ctr"/>
-            <a:r>
-              <a:rPr lang="en-GB" sz="2800" dirty="0">
-                <a:latin typeface="Times New Roman" panose="02020603050405020304" pitchFamily="18" charset="0"/>
-                <a:cs typeface="Times New Roman" panose="02020603050405020304" pitchFamily="18" charset="0"/>
-              </a:rPr>
-              <a:t>30% Presentation Template</a:t>
-            </a:r>
           </a:p>
         </p:txBody>
       </p:sp>
@@ -4515,6 +4356,14 @@
 <file path=ppt/slides/slide11.xml><?xml version="1.0" encoding="utf-8"?>
 <p:sld xmlns:a="http://schemas.openxmlformats.org/drawingml/2006/main" xmlns:r="http://schemas.openxmlformats.org/officeDocument/2006/relationships" xmlns:p="http://schemas.openxmlformats.org/presentationml/2006/main">
   <p:cSld>
+    <p:bg>
+      <p:bgPr>
+        <a:solidFill>
+          <a:schemeClr val="bg1"/>
+        </a:solidFill>
+        <a:effectLst/>
+      </p:bgPr>
+    </p:bg>
     <p:spTree>
       <p:nvGrpSpPr>
         <p:cNvPr id="1" name=""/>
@@ -4529,6 +4378,479 @@
           <a:chExt cx="0" cy="0"/>
         </a:xfrm>
       </p:grpSpPr>
+      <p:sp useBgFill="1">
+        <p:nvSpPr>
+          <p:cNvPr id="11" name="Rectangle 10">
+            <a:extLst>
+              <a:ext uri="{FF2B5EF4-FFF2-40B4-BE49-F238E27FC236}">
+                <a16:creationId xmlns:a16="http://schemas.microsoft.com/office/drawing/2014/main" id="{A8384FB5-9ADC-4DDC-881B-597D56F5B15D}"/>
+              </a:ext>
+              <a:ext uri="{C183D7F6-B498-43B3-948B-1728B52AA6E4}">
+                <adec:decorative xmlns:adec="http://schemas.microsoft.com/office/drawing/2017/decorative" val="1"/>
+              </a:ext>
+            </a:extLst>
+          </p:cNvPr>
+          <p:cNvSpPr>
+            <a:spLocks noGrp="1" noRot="1" noChangeAspect="1" noMove="1" noResize="1" noEditPoints="1" noAdjustHandles="1" noChangeArrowheads="1" noChangeShapeType="1" noTextEdit="1"/>
+          </p:cNvSpPr>
+          <p:nvPr>
+            <p:extLst>
+              <p:ext uri="{386F3935-93C4-4BCD-93E2-E3B085C9AB24}">
+                <p16:designElem xmlns:p16="http://schemas.microsoft.com/office/powerpoint/2015/main" val="1"/>
+              </p:ext>
+            </p:extLst>
+          </p:nvPr>
+        </p:nvSpPr>
+        <p:spPr>
+          <a:xfrm>
+            <a:off x="0" y="0"/>
+            <a:ext cx="9144000" cy="6858000"/>
+          </a:xfrm>
+          <a:prstGeom prst="rect">
+            <a:avLst/>
+          </a:prstGeom>
+          <a:ln w="12700" cap="flat" cmpd="sng" algn="ctr">
+            <a:noFill/>
+            <a:prstDash val="solid"/>
+            <a:miter lim="800000"/>
+          </a:ln>
+          <a:effectLst/>
+          <a:extLst>
+            <a:ext uri="{91240B29-F687-4F45-9708-019B960494DF}">
+              <a14:hiddenLine xmlns:a14="http://schemas.microsoft.com/office/drawing/2010/main" w="12700" cap="flat" cmpd="sng" algn="ctr">
+                <a:solidFill>
+                  <a:schemeClr val="accent1">
+                    <a:shade val="50000"/>
+                  </a:schemeClr>
+                </a:solidFill>
+                <a:prstDash val="solid"/>
+                <a:miter lim="800000"/>
+              </a14:hiddenLine>
+            </a:ext>
+          </a:extLst>
+        </p:spPr>
+        <p:style>
+          <a:lnRef idx="2">
+            <a:schemeClr val="accent1">
+              <a:shade val="50000"/>
+            </a:schemeClr>
+          </a:lnRef>
+          <a:fillRef idx="1">
+            <a:schemeClr val="accent1"/>
+          </a:fillRef>
+          <a:effectRef idx="0">
+            <a:schemeClr val="accent1"/>
+          </a:effectRef>
+          <a:fontRef idx="minor">
+            <a:schemeClr val="lt1"/>
+          </a:fontRef>
+        </p:style>
+        <p:txBody>
+          <a:bodyPr rtlCol="0" anchor="ctr"/>
+          <a:lstStyle/>
+          <a:p>
+            <a:pPr algn="ctr"/>
+            <a:endParaRPr lang="en-US"/>
+          </a:p>
+        </p:txBody>
+      </p:sp>
+      <p:sp>
+        <p:nvSpPr>
+          <p:cNvPr id="13" name="Rectangle 12">
+            <a:extLst>
+              <a:ext uri="{FF2B5EF4-FFF2-40B4-BE49-F238E27FC236}">
+                <a16:creationId xmlns:a16="http://schemas.microsoft.com/office/drawing/2014/main" id="{91E5A9A7-95C6-4F4F-B00E-C82E07FE62EF}"/>
+              </a:ext>
+              <a:ext uri="{C183D7F6-B498-43B3-948B-1728B52AA6E4}">
+                <adec:decorative xmlns:adec="http://schemas.microsoft.com/office/drawing/2017/decorative" val="1"/>
+              </a:ext>
+            </a:extLst>
+          </p:cNvPr>
+          <p:cNvSpPr>
+            <a:spLocks noGrp="1" noRot="1" noChangeAspect="1" noMove="1" noResize="1" noEditPoints="1" noAdjustHandles="1" noChangeArrowheads="1" noChangeShapeType="1" noTextEdit="1"/>
+          </p:cNvSpPr>
+          <p:nvPr>
+            <p:extLst>
+              <p:ext uri="{386F3935-93C4-4BCD-93E2-E3B085C9AB24}">
+                <p16:designElem xmlns:p16="http://schemas.microsoft.com/office/powerpoint/2015/main" val="1"/>
+              </p:ext>
+            </p:extLst>
+          </p:nvPr>
+        </p:nvSpPr>
+        <p:spPr>
+          <a:xfrm rot="5400000" flipH="1">
+            <a:off x="-1922632" y="1922631"/>
+            <a:ext cx="6875818" cy="3030558"/>
+          </a:xfrm>
+          <a:prstGeom prst="rect">
+            <a:avLst/>
+          </a:prstGeom>
+          <a:gradFill>
+            <a:gsLst>
+              <a:gs pos="0">
+                <a:srgbClr val="000000"/>
+              </a:gs>
+              <a:gs pos="100000">
+                <a:schemeClr val="accent1">
+                  <a:lumMod val="75000"/>
+                </a:schemeClr>
+              </a:gs>
+            </a:gsLst>
+            <a:lin ang="18600000" scaled="0"/>
+          </a:gradFill>
+          <a:ln>
+            <a:noFill/>
+          </a:ln>
+        </p:spPr>
+        <p:style>
+          <a:lnRef idx="2">
+            <a:schemeClr val="accent1">
+              <a:shade val="50000"/>
+            </a:schemeClr>
+          </a:lnRef>
+          <a:fillRef idx="1">
+            <a:schemeClr val="accent1"/>
+          </a:fillRef>
+          <a:effectRef idx="0">
+            <a:schemeClr val="accent1"/>
+          </a:effectRef>
+          <a:fontRef idx="minor">
+            <a:schemeClr val="lt1"/>
+          </a:fontRef>
+        </p:style>
+        <p:txBody>
+          <a:bodyPr rtlCol="0" anchor="ctr"/>
+          <a:lstStyle/>
+          <a:p>
+            <a:pPr algn="ctr"/>
+            <a:endParaRPr lang="en-US" dirty="0"/>
+          </a:p>
+        </p:txBody>
+      </p:sp>
+      <p:sp>
+        <p:nvSpPr>
+          <p:cNvPr id="15" name="Rectangle 14">
+            <a:extLst>
+              <a:ext uri="{FF2B5EF4-FFF2-40B4-BE49-F238E27FC236}">
+                <a16:creationId xmlns:a16="http://schemas.microsoft.com/office/drawing/2014/main" id="{D07DD2DE-F619-49DD-B5E7-03A290FF4ED1}"/>
+              </a:ext>
+              <a:ext uri="{C183D7F6-B498-43B3-948B-1728B52AA6E4}">
+                <adec:decorative xmlns:adec="http://schemas.microsoft.com/office/drawing/2017/decorative" val="1"/>
+              </a:ext>
+            </a:extLst>
+          </p:cNvPr>
+          <p:cNvSpPr>
+            <a:spLocks noGrp="1" noRot="1" noChangeAspect="1" noMove="1" noResize="1" noEditPoints="1" noAdjustHandles="1" noChangeArrowheads="1" noChangeShapeType="1" noTextEdit="1"/>
+          </p:cNvSpPr>
+          <p:nvPr>
+            <p:extLst>
+              <p:ext uri="{386F3935-93C4-4BCD-93E2-E3B085C9AB24}">
+                <p16:designElem xmlns:p16="http://schemas.microsoft.com/office/powerpoint/2015/main" val="1"/>
+              </p:ext>
+            </p:extLst>
+          </p:nvPr>
+        </p:nvSpPr>
+        <p:spPr>
+          <a:xfrm rot="16200000">
+            <a:off x="-663321" y="3165298"/>
+            <a:ext cx="4355594" cy="3028952"/>
+          </a:xfrm>
+          <a:prstGeom prst="rect">
+            <a:avLst/>
+          </a:prstGeom>
+          <a:gradFill>
+            <a:gsLst>
+              <a:gs pos="0">
+                <a:schemeClr val="accent1">
+                  <a:alpha val="50000"/>
+                </a:schemeClr>
+              </a:gs>
+              <a:gs pos="100000">
+                <a:schemeClr val="accent1">
+                  <a:lumMod val="50000"/>
+                  <a:alpha val="0"/>
+                </a:schemeClr>
+              </a:gs>
+            </a:gsLst>
+            <a:lin ang="11400000" scaled="0"/>
+          </a:gradFill>
+          <a:ln>
+            <a:noFill/>
+          </a:ln>
+        </p:spPr>
+        <p:style>
+          <a:lnRef idx="2">
+            <a:schemeClr val="accent1">
+              <a:shade val="50000"/>
+            </a:schemeClr>
+          </a:lnRef>
+          <a:fillRef idx="1">
+            <a:schemeClr val="accent1"/>
+          </a:fillRef>
+          <a:effectRef idx="0">
+            <a:schemeClr val="accent1"/>
+          </a:effectRef>
+          <a:fontRef idx="minor">
+            <a:schemeClr val="lt1"/>
+          </a:fontRef>
+        </p:style>
+        <p:txBody>
+          <a:bodyPr rtlCol="0" anchor="ctr"/>
+          <a:lstStyle/>
+          <a:p>
+            <a:pPr algn="ctr"/>
+            <a:endParaRPr lang="en-US"/>
+          </a:p>
+        </p:txBody>
+      </p:sp>
+      <p:sp>
+        <p:nvSpPr>
+          <p:cNvPr id="17" name="Rectangle 16">
+            <a:extLst>
+              <a:ext uri="{FF2B5EF4-FFF2-40B4-BE49-F238E27FC236}">
+                <a16:creationId xmlns:a16="http://schemas.microsoft.com/office/drawing/2014/main" id="{85149191-5F60-4A28-AAFF-039F96B0F3EC}"/>
+              </a:ext>
+              <a:ext uri="{C183D7F6-B498-43B3-948B-1728B52AA6E4}">
+                <adec:decorative xmlns:adec="http://schemas.microsoft.com/office/drawing/2017/decorative" val="1"/>
+              </a:ext>
+            </a:extLst>
+          </p:cNvPr>
+          <p:cNvSpPr>
+            <a:spLocks noGrp="1" noRot="1" noChangeAspect="1" noMove="1" noResize="1" noEditPoints="1" noAdjustHandles="1" noChangeArrowheads="1" noChangeShapeType="1" noTextEdit="1"/>
+          </p:cNvSpPr>
+          <p:nvPr>
+            <p:extLst>
+              <p:ext uri="{386F3935-93C4-4BCD-93E2-E3B085C9AB24}">
+                <p16:designElem xmlns:p16="http://schemas.microsoft.com/office/powerpoint/2015/main" val="1"/>
+              </p:ext>
+            </p:extLst>
+          </p:nvPr>
+        </p:nvSpPr>
+        <p:spPr>
+          <a:xfrm rot="16200000" flipH="1">
+            <a:off x="-1742858" y="2085760"/>
+            <a:ext cx="6857572" cy="2686051"/>
+          </a:xfrm>
+          <a:prstGeom prst="rect">
+            <a:avLst/>
+          </a:prstGeom>
+          <a:gradFill>
+            <a:gsLst>
+              <a:gs pos="0">
+                <a:srgbClr val="000000">
+                  <a:alpha val="59000"/>
+                </a:srgbClr>
+              </a:gs>
+              <a:gs pos="69000">
+                <a:schemeClr val="accent1">
+                  <a:alpha val="0"/>
+                </a:schemeClr>
+              </a:gs>
+            </a:gsLst>
+            <a:lin ang="13200000" scaled="0"/>
+          </a:gradFill>
+          <a:ln>
+            <a:noFill/>
+          </a:ln>
+        </p:spPr>
+        <p:style>
+          <a:lnRef idx="2">
+            <a:schemeClr val="accent1">
+              <a:shade val="50000"/>
+            </a:schemeClr>
+          </a:lnRef>
+          <a:fillRef idx="1">
+            <a:schemeClr val="accent1"/>
+          </a:fillRef>
+          <a:effectRef idx="0">
+            <a:schemeClr val="accent1"/>
+          </a:effectRef>
+          <a:fontRef idx="minor">
+            <a:schemeClr val="lt1"/>
+          </a:fontRef>
+        </p:style>
+        <p:txBody>
+          <a:bodyPr rtlCol="0" anchor="ctr"/>
+          <a:lstStyle/>
+          <a:p>
+            <a:pPr algn="ctr"/>
+            <a:endParaRPr lang="en-US" dirty="0"/>
+          </a:p>
+        </p:txBody>
+      </p:sp>
+      <p:sp>
+        <p:nvSpPr>
+          <p:cNvPr id="19" name="Freeform: Shape 18">
+            <a:extLst>
+              <a:ext uri="{FF2B5EF4-FFF2-40B4-BE49-F238E27FC236}">
+                <a16:creationId xmlns:a16="http://schemas.microsoft.com/office/drawing/2014/main" id="{F8260ED5-17F7-4158-B241-D51DD4CF1B7E}"/>
+              </a:ext>
+              <a:ext uri="{C183D7F6-B498-43B3-948B-1728B52AA6E4}">
+                <adec:decorative xmlns:adec="http://schemas.microsoft.com/office/drawing/2017/decorative" val="1"/>
+              </a:ext>
+            </a:extLst>
+          </p:cNvPr>
+          <p:cNvSpPr>
+            <a:spLocks noGrp="1" noRot="1" noChangeAspect="1" noMove="1" noResize="1" noEditPoints="1" noAdjustHandles="1" noChangeArrowheads="1" noChangeShapeType="1" noTextEdit="1"/>
+          </p:cNvSpPr>
+          <p:nvPr>
+            <p:extLst>
+              <p:ext uri="{386F3935-93C4-4BCD-93E2-E3B085C9AB24}">
+                <p16:designElem xmlns:p16="http://schemas.microsoft.com/office/powerpoint/2015/main" val="1"/>
+              </p:ext>
+            </p:extLst>
+          </p:nvPr>
+        </p:nvSpPr>
+        <p:spPr>
+          <a:xfrm rot="6097846">
+            <a:off x="-1161554" y="1712395"/>
+            <a:ext cx="4808302" cy="3066500"/>
+          </a:xfrm>
+          <a:custGeom>
+            <a:avLst/>
+            <a:gdLst>
+              <a:gd name="connsiteX0" fmla="*/ 48844 w 4808302"/>
+              <a:gd name="connsiteY0" fmla="*/ 2888671 h 4088666"/>
+              <a:gd name="connsiteX1" fmla="*/ 0 w 4808302"/>
+              <a:gd name="connsiteY1" fmla="*/ 2404151 h 4088666"/>
+              <a:gd name="connsiteX2" fmla="*/ 2404151 w 4808302"/>
+              <a:gd name="connsiteY2" fmla="*/ 0 h 4088666"/>
+              <a:gd name="connsiteX3" fmla="*/ 4808302 w 4808302"/>
+              <a:gd name="connsiteY3" fmla="*/ 2404151 h 4088666"/>
+              <a:gd name="connsiteX4" fmla="*/ 4700216 w 4808302"/>
+              <a:gd name="connsiteY4" fmla="*/ 3119072 h 4088666"/>
+              <a:gd name="connsiteX5" fmla="*/ 4643143 w 4808302"/>
+              <a:gd name="connsiteY5" fmla="*/ 3275009 h 4088666"/>
+              <a:gd name="connsiteX6" fmla="*/ 690093 w 4808302"/>
+              <a:gd name="connsiteY6" fmla="*/ 4088666 h 4088666"/>
+              <a:gd name="connsiteX7" fmla="*/ 548991 w 4808302"/>
+              <a:gd name="connsiteY7" fmla="*/ 3933414 h 4088666"/>
+              <a:gd name="connsiteX8" fmla="*/ 48844 w 4808302"/>
+              <a:gd name="connsiteY8" fmla="*/ 2888671 h 4088666"/>
+            </a:gdLst>
+            <a:ahLst/>
+            <a:cxnLst>
+              <a:cxn ang="0">
+                <a:pos x="connsiteX0" y="connsiteY0"/>
+              </a:cxn>
+              <a:cxn ang="0">
+                <a:pos x="connsiteX1" y="connsiteY1"/>
+              </a:cxn>
+              <a:cxn ang="0">
+                <a:pos x="connsiteX2" y="connsiteY2"/>
+              </a:cxn>
+              <a:cxn ang="0">
+                <a:pos x="connsiteX3" y="connsiteY3"/>
+              </a:cxn>
+              <a:cxn ang="0">
+                <a:pos x="connsiteX4" y="connsiteY4"/>
+              </a:cxn>
+              <a:cxn ang="0">
+                <a:pos x="connsiteX5" y="connsiteY5"/>
+              </a:cxn>
+              <a:cxn ang="0">
+                <a:pos x="connsiteX6" y="connsiteY6"/>
+              </a:cxn>
+              <a:cxn ang="0">
+                <a:pos x="connsiteX7" y="connsiteY7"/>
+              </a:cxn>
+              <a:cxn ang="0">
+                <a:pos x="connsiteX8" y="connsiteY8"/>
+              </a:cxn>
+            </a:cxnLst>
+            <a:rect l="l" t="t" r="r" b="b"/>
+            <a:pathLst>
+              <a:path w="4808302" h="4088666">
+                <a:moveTo>
+                  <a:pt x="48844" y="2888671"/>
+                </a:moveTo>
+                <a:cubicBezTo>
+                  <a:pt x="16818" y="2732167"/>
+                  <a:pt x="0" y="2570123"/>
+                  <a:pt x="0" y="2404151"/>
+                </a:cubicBezTo>
+                <a:cubicBezTo>
+                  <a:pt x="0" y="1076375"/>
+                  <a:pt x="1076375" y="0"/>
+                  <a:pt x="2404151" y="0"/>
+                </a:cubicBezTo>
+                <a:cubicBezTo>
+                  <a:pt x="3731927" y="0"/>
+                  <a:pt x="4808302" y="1076375"/>
+                  <a:pt x="4808302" y="2404151"/>
+                </a:cubicBezTo>
+                <a:cubicBezTo>
+                  <a:pt x="4808302" y="2653109"/>
+                  <a:pt x="4770461" y="2893229"/>
+                  <a:pt x="4700216" y="3119072"/>
+                </a:cubicBezTo>
+                <a:lnTo>
+                  <a:pt x="4643143" y="3275009"/>
+                </a:lnTo>
+                <a:lnTo>
+                  <a:pt x="690093" y="4088666"/>
+                </a:lnTo>
+                <a:lnTo>
+                  <a:pt x="548991" y="3933414"/>
+                </a:lnTo>
+                <a:cubicBezTo>
+                  <a:pt x="304015" y="3636572"/>
+                  <a:pt x="128908" y="3279932"/>
+                  <a:pt x="48844" y="2888671"/>
+                </a:cubicBezTo>
+                <a:close/>
+              </a:path>
+            </a:pathLst>
+          </a:custGeom>
+          <a:gradFill>
+            <a:gsLst>
+              <a:gs pos="39000">
+                <a:schemeClr val="accent1">
+                  <a:lumMod val="60000"/>
+                  <a:lumOff val="40000"/>
+                  <a:alpha val="0"/>
+                </a:schemeClr>
+              </a:gs>
+              <a:gs pos="100000">
+                <a:schemeClr val="accent1">
+                  <a:lumMod val="75000"/>
+                  <a:alpha val="26000"/>
+                </a:schemeClr>
+              </a:gs>
+            </a:gsLst>
+            <a:lin ang="18600000" scaled="0"/>
+          </a:gradFill>
+          <a:ln>
+            <a:noFill/>
+          </a:ln>
+        </p:spPr>
+        <p:style>
+          <a:lnRef idx="2">
+            <a:schemeClr val="accent1">
+              <a:shade val="50000"/>
+            </a:schemeClr>
+          </a:lnRef>
+          <a:fillRef idx="1">
+            <a:schemeClr val="accent1"/>
+          </a:fillRef>
+          <a:effectRef idx="0">
+            <a:schemeClr val="accent1"/>
+          </a:effectRef>
+          <a:fontRef idx="minor">
+            <a:schemeClr val="lt1"/>
+          </a:fontRef>
+        </p:style>
+        <p:txBody>
+          <a:bodyPr wrap="square" rtlCol="0" anchor="ctr">
+            <a:noAutofit/>
+          </a:bodyPr>
+          <a:lstStyle/>
+          <a:p>
+            <a:pPr algn="ctr"/>
+            <a:endParaRPr lang="en-US" dirty="0"/>
+          </a:p>
+        </p:txBody>
+      </p:sp>
       <p:sp>
         <p:nvSpPr>
           <p:cNvPr id="2" name="Title 1"/>
@@ -4539,68 +4861,126 @@
             <p:ph type="title"/>
           </p:nvPr>
         </p:nvSpPr>
-        <p:spPr/>
-        <p:txBody>
-          <a:bodyPr/>
-          <a:lstStyle/>
-          <a:p>
-            <a:pPr algn="l"/>
-            <a:r>
-              <a:rPr lang="en-US" dirty="0">
-                <a:latin typeface="Times New Roman" panose="02020603050405020304" pitchFamily="18" charset="0"/>
-                <a:cs typeface="Times New Roman" panose="02020603050405020304" pitchFamily="18" charset="0"/>
+        <p:spPr>
+          <a:xfrm>
+            <a:off x="495030" y="2767106"/>
+            <a:ext cx="2160621" cy="3071906"/>
+          </a:xfrm>
+        </p:spPr>
+        <p:txBody>
+          <a:bodyPr vert="horz" lIns="91440" tIns="45720" rIns="91440" bIns="45720" rtlCol="0" anchor="t">
+            <a:normAutofit/>
+          </a:bodyPr>
+          <a:lstStyle/>
+          <a:p>
+            <a:pPr algn="l">
+              <a:lnSpc>
+                <a:spcPct val="90000"/>
+              </a:lnSpc>
+            </a:pPr>
+            <a:r>
+              <a:rPr lang="en-US" sz="3500" kern="1200">
+                <a:solidFill>
+                  <a:srgbClr val="FFFFFF"/>
+                </a:solidFill>
+                <a:latin typeface="+mj-lt"/>
+                <a:ea typeface="+mj-ea"/>
+                <a:cs typeface="+mj-cs"/>
               </a:rPr>
               <a:t>Class Diagram </a:t>
             </a:r>
           </a:p>
         </p:txBody>
       </p:sp>
-      <p:sp>
-        <p:nvSpPr>
-          <p:cNvPr id="3" name="Content Placeholder 2"/>
+      <p:pic>
+        <p:nvPicPr>
+          <p:cNvPr id="6" name="Content Placeholder 5" descr="A screenshot of a computer program&#10;&#10;Description automatically generated">
+            <a:extLst>
+              <a:ext uri="{FF2B5EF4-FFF2-40B4-BE49-F238E27FC236}">
+                <a16:creationId xmlns:a16="http://schemas.microsoft.com/office/drawing/2014/main" id="{6269909A-7028-F2E0-EE4B-58C82D4CFD5F}"/>
+              </a:ext>
+            </a:extLst>
+          </p:cNvPr>
+          <p:cNvPicPr>
+            <a:picLocks noGrp="1" noChangeAspect="1"/>
+          </p:cNvPicPr>
+          <p:nvPr>
+            <p:ph idx="1"/>
+          </p:nvPr>
+        </p:nvPicPr>
+        <p:blipFill>
+          <a:blip r:embed="rId2" cstate="print">
+            <a:extLst>
+              <a:ext uri="{28A0092B-C50C-407E-A947-70E740481C1C}">
+                <a14:useLocalDpi xmlns:a14="http://schemas.microsoft.com/office/drawing/2010/main" val="0"/>
+              </a:ext>
+            </a:extLst>
+          </a:blip>
+          <a:stretch>
+            <a:fillRect/>
+          </a:stretch>
+        </p:blipFill>
+        <p:spPr>
+          <a:xfrm>
+            <a:off x="3376821" y="1755786"/>
+            <a:ext cx="5419311" cy="3346427"/>
+          </a:xfrm>
+          <a:prstGeom prst="rect">
+            <a:avLst/>
+          </a:prstGeom>
+        </p:spPr>
+      </p:pic>
+      <p:sp>
+        <p:nvSpPr>
+          <p:cNvPr id="4" name="Slide Number Placeholder 3"/>
           <p:cNvSpPr>
             <a:spLocks noGrp="1"/>
           </p:cNvSpPr>
           <p:nvPr>
-            <p:ph idx="1"/>
-          </p:nvPr>
-        </p:nvSpPr>
-        <p:spPr/>
-        <p:txBody>
-          <a:bodyPr/>
+            <p:ph type="sldNum" sz="quarter" idx="12"/>
+          </p:nvPr>
+        </p:nvSpPr>
+        <p:spPr>
+          <a:xfrm>
+            <a:off x="8778239" y="6455664"/>
+            <a:ext cx="336042" cy="365125"/>
+          </a:xfrm>
+        </p:spPr>
+        <p:txBody>
+          <a:bodyPr vert="horz" lIns="91440" tIns="45720" rIns="91440" bIns="45720" rtlCol="0" anchor="ctr">
+            <a:normAutofit/>
+          </a:bodyPr>
           <a:lstStyle/>
           <a:p>
             <a:pPr>
-              <a:buNone/>
+              <a:spcAft>
+                <a:spcPts val="600"/>
+              </a:spcAft>
             </a:pPr>
-            <a:endParaRPr lang="en-US" dirty="0">
-              <a:latin typeface="Times New Roman" panose="02020603050405020304" pitchFamily="18" charset="0"/>
-              <a:cs typeface="Times New Roman" panose="02020603050405020304" pitchFamily="18" charset="0"/>
-            </a:endParaRPr>
-          </a:p>
-        </p:txBody>
-      </p:sp>
-      <p:sp>
-        <p:nvSpPr>
-          <p:cNvPr id="4" name="Slide Number Placeholder 3"/>
-          <p:cNvSpPr>
-            <a:spLocks noGrp="1"/>
-          </p:cNvSpPr>
-          <p:nvPr>
-            <p:ph type="sldNum" sz="quarter" idx="12"/>
-          </p:nvPr>
-        </p:nvSpPr>
-        <p:spPr/>
-        <p:txBody>
-          <a:bodyPr/>
-          <a:lstStyle/>
-          <a:p>
             <a:fld id="{DC2A8C5E-5ACC-4DAB-B41C-5718F8C58B6D}" type="slidenum">
-              <a:rPr lang="en-US" smtClean="0"/>
-              <a:pPr/>
+              <a:rPr lang="en-US" sz="1000">
+                <a:solidFill>
+                  <a:schemeClr val="tx1">
+                    <a:lumMod val="50000"/>
+                    <a:lumOff val="50000"/>
+                  </a:schemeClr>
+                </a:solidFill>
+              </a:rPr>
+              <a:pPr>
+                <a:spcAft>
+                  <a:spcPts val="600"/>
+                </a:spcAft>
+              </a:pPr>
               <a:t>11</a:t>
             </a:fld>
-            <a:endParaRPr lang="en-US"/>
+            <a:endParaRPr lang="en-US" sz="1000">
+              <a:solidFill>
+                <a:schemeClr val="tx1">
+                  <a:lumMod val="50000"/>
+                  <a:lumOff val="50000"/>
+                </a:schemeClr>
+              </a:solidFill>
+            </a:endParaRPr>
           </a:p>
         </p:txBody>
       </p:sp>
@@ -4615,9 +4995,23 @@
 <file path=ppt/slides/slide12.xml><?xml version="1.0" encoding="utf-8"?>
 <p:sld xmlns:a="http://schemas.openxmlformats.org/drawingml/2006/main" xmlns:r="http://schemas.openxmlformats.org/officeDocument/2006/relationships" xmlns:p="http://schemas.openxmlformats.org/presentationml/2006/main">
   <p:cSld>
+    <p:bg>
+      <p:bgPr>
+        <a:solidFill>
+          <a:schemeClr val="bg1"/>
+        </a:solidFill>
+        <a:effectLst/>
+      </p:bgPr>
+    </p:bg>
     <p:spTree>
       <p:nvGrpSpPr>
-        <p:cNvPr id="1" name=""/>
+        <p:cNvPr id="1" name="">
+          <a:extLst>
+            <a:ext uri="{FF2B5EF4-FFF2-40B4-BE49-F238E27FC236}">
+              <a16:creationId xmlns:a16="http://schemas.microsoft.com/office/drawing/2014/main" id="{8FCCBC7D-E625-373F-08CA-7F944A9EBC0B}"/>
+            </a:ext>
+          </a:extLst>
+        </p:cNvPr>
         <p:cNvGrpSpPr/>
         <p:nvPr/>
       </p:nvGrpSpPr>
@@ -4629,9 +5023,318 @@
           <a:chExt cx="0" cy="0"/>
         </a:xfrm>
       </p:grpSpPr>
-      <p:sp>
-        <p:nvSpPr>
-          <p:cNvPr id="2" name="Title 1"/>
+      <p:sp useBgFill="1">
+        <p:nvSpPr>
+          <p:cNvPr id="24" name="Rectangle 23">
+            <a:extLst>
+              <a:ext uri="{FF2B5EF4-FFF2-40B4-BE49-F238E27FC236}">
+                <a16:creationId xmlns:a16="http://schemas.microsoft.com/office/drawing/2014/main" id="{A8384FB5-9ADC-4DDC-881B-597D56F5B15D}"/>
+              </a:ext>
+              <a:ext uri="{C183D7F6-B498-43B3-948B-1728B52AA6E4}">
+                <adec:decorative xmlns:adec="http://schemas.microsoft.com/office/drawing/2017/decorative" val="1"/>
+              </a:ext>
+            </a:extLst>
+          </p:cNvPr>
+          <p:cNvSpPr>
+            <a:spLocks noGrp="1" noRot="1" noChangeAspect="1" noMove="1" noResize="1" noEditPoints="1" noAdjustHandles="1" noChangeArrowheads="1" noChangeShapeType="1" noTextEdit="1"/>
+          </p:cNvSpPr>
+          <p:nvPr>
+            <p:extLst>
+              <p:ext uri="{386F3935-93C4-4BCD-93E2-E3B085C9AB24}">
+                <p16:designElem xmlns:p16="http://schemas.microsoft.com/office/powerpoint/2015/main" val="1"/>
+              </p:ext>
+            </p:extLst>
+          </p:nvPr>
+        </p:nvSpPr>
+        <p:spPr>
+          <a:xfrm>
+            <a:off x="0" y="0"/>
+            <a:ext cx="9144000" cy="6858000"/>
+          </a:xfrm>
+          <a:prstGeom prst="rect">
+            <a:avLst/>
+          </a:prstGeom>
+          <a:ln w="12700" cap="flat" cmpd="sng" algn="ctr">
+            <a:noFill/>
+            <a:prstDash val="solid"/>
+            <a:miter lim="800000"/>
+          </a:ln>
+          <a:effectLst/>
+          <a:extLst>
+            <a:ext uri="{91240B29-F687-4F45-9708-019B960494DF}">
+              <a14:hiddenLine xmlns:a14="http://schemas.microsoft.com/office/drawing/2010/main" w="12700" cap="flat" cmpd="sng" algn="ctr">
+                <a:solidFill>
+                  <a:schemeClr val="accent1">
+                    <a:shade val="50000"/>
+                  </a:schemeClr>
+                </a:solidFill>
+                <a:prstDash val="solid"/>
+                <a:miter lim="800000"/>
+              </a14:hiddenLine>
+            </a:ext>
+          </a:extLst>
+        </p:spPr>
+        <p:style>
+          <a:lnRef idx="2">
+            <a:schemeClr val="accent1">
+              <a:shade val="50000"/>
+            </a:schemeClr>
+          </a:lnRef>
+          <a:fillRef idx="1">
+            <a:schemeClr val="accent1"/>
+          </a:fillRef>
+          <a:effectRef idx="0">
+            <a:schemeClr val="accent1"/>
+          </a:effectRef>
+          <a:fontRef idx="minor">
+            <a:schemeClr val="lt1"/>
+          </a:fontRef>
+        </p:style>
+        <p:txBody>
+          <a:bodyPr rtlCol="0" anchor="ctr"/>
+          <a:lstStyle/>
+          <a:p>
+            <a:pPr algn="ctr"/>
+            <a:endParaRPr lang="en-US"/>
+          </a:p>
+        </p:txBody>
+      </p:sp>
+      <p:sp>
+        <p:nvSpPr>
+          <p:cNvPr id="26" name="Rectangle 25">
+            <a:extLst>
+              <a:ext uri="{FF2B5EF4-FFF2-40B4-BE49-F238E27FC236}">
+                <a16:creationId xmlns:a16="http://schemas.microsoft.com/office/drawing/2014/main" id="{1199E1B1-A8C0-4FE8-A5A8-1CB41D69F857}"/>
+              </a:ext>
+              <a:ext uri="{C183D7F6-B498-43B3-948B-1728B52AA6E4}">
+                <adec:decorative xmlns:adec="http://schemas.microsoft.com/office/drawing/2017/decorative" val="1"/>
+              </a:ext>
+            </a:extLst>
+          </p:cNvPr>
+          <p:cNvSpPr>
+            <a:spLocks noGrp="1" noRot="1" noChangeAspect="1" noMove="1" noResize="1" noEditPoints="1" noAdjustHandles="1" noChangeArrowheads="1" noChangeShapeType="1" noTextEdit="1"/>
+          </p:cNvSpPr>
+          <p:nvPr>
+            <p:extLst>
+              <p:ext uri="{386F3935-93C4-4BCD-93E2-E3B085C9AB24}">
+                <p16:designElem xmlns:p16="http://schemas.microsoft.com/office/powerpoint/2015/main" val="1"/>
+              </p:ext>
+            </p:extLst>
+          </p:nvPr>
+        </p:nvSpPr>
+        <p:spPr>
+          <a:xfrm rot="10800000" flipH="1">
+            <a:off x="1" y="0"/>
+            <a:ext cx="9143999" cy="1575955"/>
+          </a:xfrm>
+          <a:prstGeom prst="rect">
+            <a:avLst/>
+          </a:prstGeom>
+          <a:gradFill>
+            <a:gsLst>
+              <a:gs pos="0">
+                <a:srgbClr val="000000">
+                  <a:alpha val="96000"/>
+                </a:srgbClr>
+              </a:gs>
+              <a:gs pos="100000">
+                <a:schemeClr val="accent1">
+                  <a:lumMod val="75000"/>
+                </a:schemeClr>
+              </a:gs>
+            </a:gsLst>
+            <a:lin ang="6000000" scaled="0"/>
+          </a:gradFill>
+          <a:ln>
+            <a:noFill/>
+          </a:ln>
+        </p:spPr>
+        <p:style>
+          <a:lnRef idx="2">
+            <a:schemeClr val="accent1">
+              <a:shade val="50000"/>
+            </a:schemeClr>
+          </a:lnRef>
+          <a:fillRef idx="1">
+            <a:schemeClr val="accent1"/>
+          </a:fillRef>
+          <a:effectRef idx="0">
+            <a:schemeClr val="accent1"/>
+          </a:effectRef>
+          <a:fontRef idx="minor">
+            <a:schemeClr val="lt1"/>
+          </a:fontRef>
+        </p:style>
+        <p:txBody>
+          <a:bodyPr rtlCol="0" anchor="ctr"/>
+          <a:lstStyle/>
+          <a:p>
+            <a:pPr algn="ctr"/>
+            <a:endParaRPr lang="en-US"/>
+          </a:p>
+        </p:txBody>
+      </p:sp>
+      <p:sp>
+        <p:nvSpPr>
+          <p:cNvPr id="28" name="Rectangle 27">
+            <a:extLst>
+              <a:ext uri="{FF2B5EF4-FFF2-40B4-BE49-F238E27FC236}">
+                <a16:creationId xmlns:a16="http://schemas.microsoft.com/office/drawing/2014/main" id="{84A8DE83-DE75-4B41-9DB4-A7EC0B0DEC0B}"/>
+              </a:ext>
+              <a:ext uri="{C183D7F6-B498-43B3-948B-1728B52AA6E4}">
+                <adec:decorative xmlns:adec="http://schemas.microsoft.com/office/drawing/2017/decorative" val="1"/>
+              </a:ext>
+            </a:extLst>
+          </p:cNvPr>
+          <p:cNvSpPr>
+            <a:spLocks noGrp="1" noRot="1" noChangeAspect="1" noMove="1" noResize="1" noEditPoints="1" noAdjustHandles="1" noChangeArrowheads="1" noChangeShapeType="1" noTextEdit="1"/>
+          </p:cNvSpPr>
+          <p:nvPr>
+            <p:extLst>
+              <p:ext uri="{386F3935-93C4-4BCD-93E2-E3B085C9AB24}">
+                <p16:designElem xmlns:p16="http://schemas.microsoft.com/office/powerpoint/2015/main" val="1"/>
+              </p:ext>
+            </p:extLst>
+          </p:nvPr>
+        </p:nvSpPr>
+        <p:spPr>
+          <a:xfrm>
+            <a:off x="0" y="0"/>
+            <a:ext cx="6096642" cy="1575461"/>
+          </a:xfrm>
+          <a:prstGeom prst="rect">
+            <a:avLst/>
+          </a:prstGeom>
+          <a:gradFill>
+            <a:gsLst>
+              <a:gs pos="0">
+                <a:schemeClr val="accent1">
+                  <a:alpha val="41000"/>
+                </a:schemeClr>
+              </a:gs>
+              <a:gs pos="74000">
+                <a:schemeClr val="accent1">
+                  <a:lumMod val="60000"/>
+                  <a:lumOff val="40000"/>
+                  <a:alpha val="0"/>
+                </a:schemeClr>
+              </a:gs>
+            </a:gsLst>
+            <a:lin ang="8400000" scaled="0"/>
+          </a:gradFill>
+          <a:ln>
+            <a:noFill/>
+          </a:ln>
+        </p:spPr>
+        <p:style>
+          <a:lnRef idx="2">
+            <a:schemeClr val="accent1">
+              <a:shade val="50000"/>
+            </a:schemeClr>
+          </a:lnRef>
+          <a:fillRef idx="1">
+            <a:schemeClr val="accent1"/>
+          </a:fillRef>
+          <a:effectRef idx="0">
+            <a:schemeClr val="accent1"/>
+          </a:effectRef>
+          <a:fontRef idx="minor">
+            <a:schemeClr val="lt1"/>
+          </a:fontRef>
+        </p:style>
+        <p:txBody>
+          <a:bodyPr rtlCol="0" anchor="ctr"/>
+          <a:lstStyle/>
+          <a:p>
+            <a:pPr algn="ctr"/>
+            <a:endParaRPr lang="en-US"/>
+          </a:p>
+        </p:txBody>
+      </p:sp>
+      <p:sp>
+        <p:nvSpPr>
+          <p:cNvPr id="30" name="Rectangle 29">
+            <a:extLst>
+              <a:ext uri="{FF2B5EF4-FFF2-40B4-BE49-F238E27FC236}">
+                <a16:creationId xmlns:a16="http://schemas.microsoft.com/office/drawing/2014/main" id="{A7009A0A-BEF5-4EAC-AF15-E4F9F002E239}"/>
+              </a:ext>
+              <a:ext uri="{C183D7F6-B498-43B3-948B-1728B52AA6E4}">
+                <adec:decorative xmlns:adec="http://schemas.microsoft.com/office/drawing/2017/decorative" val="1"/>
+              </a:ext>
+            </a:extLst>
+          </p:cNvPr>
+          <p:cNvSpPr>
+            <a:spLocks noGrp="1" noRot="1" noChangeAspect="1" noMove="1" noResize="1" noEditPoints="1" noAdjustHandles="1" noChangeArrowheads="1" noChangeShapeType="1" noTextEdit="1"/>
+          </p:cNvSpPr>
+          <p:nvPr>
+            <p:extLst>
+              <p:ext uri="{386F3935-93C4-4BCD-93E2-E3B085C9AB24}">
+                <p16:designElem xmlns:p16="http://schemas.microsoft.com/office/powerpoint/2015/main" val="1"/>
+              </p:ext>
+            </p:extLst>
+          </p:nvPr>
+        </p:nvSpPr>
+        <p:spPr>
+          <a:xfrm flipH="1">
+            <a:off x="-2" y="-1"/>
+            <a:ext cx="9144001" cy="1574311"/>
+          </a:xfrm>
+          <a:prstGeom prst="rect">
+            <a:avLst/>
+          </a:prstGeom>
+          <a:gradFill>
+            <a:gsLst>
+              <a:gs pos="0">
+                <a:srgbClr val="000000">
+                  <a:alpha val="63000"/>
+                </a:srgbClr>
+              </a:gs>
+              <a:gs pos="78000">
+                <a:schemeClr val="accent1">
+                  <a:alpha val="15000"/>
+                </a:schemeClr>
+              </a:gs>
+            </a:gsLst>
+            <a:lin ang="15600000" scaled="0"/>
+          </a:gradFill>
+          <a:ln>
+            <a:noFill/>
+          </a:ln>
+        </p:spPr>
+        <p:style>
+          <a:lnRef idx="2">
+            <a:schemeClr val="accent1">
+              <a:shade val="50000"/>
+            </a:schemeClr>
+          </a:lnRef>
+          <a:fillRef idx="1">
+            <a:schemeClr val="accent1"/>
+          </a:fillRef>
+          <a:effectRef idx="0">
+            <a:schemeClr val="accent1"/>
+          </a:effectRef>
+          <a:fontRef idx="minor">
+            <a:schemeClr val="lt1"/>
+          </a:fontRef>
+        </p:style>
+        <p:txBody>
+          <a:bodyPr rtlCol="0" anchor="ctr"/>
+          <a:lstStyle/>
+          <a:p>
+            <a:pPr algn="ctr"/>
+            <a:endParaRPr lang="en-US"/>
+          </a:p>
+        </p:txBody>
+      </p:sp>
+      <p:sp>
+        <p:nvSpPr>
+          <p:cNvPr id="2" name="Title 1">
+            <a:extLst>
+              <a:ext uri="{FF2B5EF4-FFF2-40B4-BE49-F238E27FC236}">
+                <a16:creationId xmlns:a16="http://schemas.microsoft.com/office/drawing/2014/main" id="{36174E76-24A2-4D9E-AD91-D512DD94159B}"/>
+              </a:ext>
+            </a:extLst>
+          </p:cNvPr>
           <p:cNvSpPr>
             <a:spLocks noGrp="1"/>
           </p:cNvSpPr>
@@ -4639,78 +5342,141 @@
             <p:ph type="title"/>
           </p:nvPr>
         </p:nvSpPr>
-        <p:spPr/>
-        <p:txBody>
-          <a:bodyPr/>
-          <a:lstStyle/>
-          <a:p>
-            <a:pPr algn="l"/>
-            <a:r>
-              <a:rPr lang="en-US" dirty="0">
-                <a:latin typeface="Times New Roman" panose="02020603050405020304" pitchFamily="18" charset="0"/>
-                <a:cs typeface="Times New Roman" panose="02020603050405020304" pitchFamily="18" charset="0"/>
+        <p:spPr>
+          <a:xfrm>
+            <a:off x="524784" y="248038"/>
+            <a:ext cx="5297791" cy="1159200"/>
+          </a:xfrm>
+        </p:spPr>
+        <p:txBody>
+          <a:bodyPr vert="horz" lIns="91440" tIns="45720" rIns="91440" bIns="45720" rtlCol="0" anchor="ctr">
+            <a:normAutofit/>
+          </a:bodyPr>
+          <a:lstStyle/>
+          <a:p>
+            <a:pPr algn="l">
+              <a:lnSpc>
+                <a:spcPct val="90000"/>
+              </a:lnSpc>
+            </a:pPr>
+            <a:r>
+              <a:rPr lang="en-US" sz="3500" kern="1200" dirty="0">
+                <a:solidFill>
+                  <a:srgbClr val="FFFFFF"/>
+                </a:solidFill>
+                <a:latin typeface="+mj-lt"/>
+                <a:ea typeface="+mj-ea"/>
+                <a:cs typeface="+mj-cs"/>
               </a:rPr>
-              <a:t>Package Diagram </a:t>
-            </a:r>
-          </a:p>
-        </p:txBody>
-      </p:sp>
-      <p:sp>
-        <p:nvSpPr>
-          <p:cNvPr id="3" name="Content Placeholder 2"/>
+              <a:t>Sequence Diagram</a:t>
+            </a:r>
+          </a:p>
+        </p:txBody>
+      </p:sp>
+      <p:pic>
+        <p:nvPicPr>
+          <p:cNvPr id="8" name="Content Placeholder 7" descr="A diagram of a project&#10;&#10;Description automatically generated">
+            <a:extLst>
+              <a:ext uri="{FF2B5EF4-FFF2-40B4-BE49-F238E27FC236}">
+                <a16:creationId xmlns:a16="http://schemas.microsoft.com/office/drawing/2014/main" id="{5B7EAC2A-9FEA-A695-0D80-0F5FD0AACF12}"/>
+              </a:ext>
+            </a:extLst>
+          </p:cNvPr>
+          <p:cNvPicPr>
+            <a:picLocks noGrp="1" noChangeAspect="1"/>
+          </p:cNvPicPr>
+          <p:nvPr>
+            <p:ph idx="1"/>
+          </p:nvPr>
+        </p:nvPicPr>
+        <p:blipFill>
+          <a:blip r:embed="rId2">
+            <a:extLst>
+              <a:ext uri="{28A0092B-C50C-407E-A947-70E740481C1C}">
+                <a14:useLocalDpi xmlns:a14="http://schemas.microsoft.com/office/drawing/2010/main" val="0"/>
+              </a:ext>
+            </a:extLst>
+          </a:blip>
+          <a:stretch>
+            <a:fillRect/>
+          </a:stretch>
+        </p:blipFill>
+        <p:spPr>
+          <a:xfrm>
+            <a:off x="324168" y="2397664"/>
+            <a:ext cx="8495662" cy="3589417"/>
+          </a:xfrm>
+          <a:prstGeom prst="rect">
+            <a:avLst/>
+          </a:prstGeom>
+        </p:spPr>
+      </p:pic>
+      <p:sp>
+        <p:nvSpPr>
+          <p:cNvPr id="4" name="Slide Number Placeholder 3">
+            <a:extLst>
+              <a:ext uri="{FF2B5EF4-FFF2-40B4-BE49-F238E27FC236}">
+                <a16:creationId xmlns:a16="http://schemas.microsoft.com/office/drawing/2014/main" id="{6C270460-3B06-E1E3-C065-1BCE50BF4BF4}"/>
+              </a:ext>
+            </a:extLst>
+          </p:cNvPr>
           <p:cNvSpPr>
             <a:spLocks noGrp="1"/>
           </p:cNvSpPr>
           <p:nvPr>
-            <p:ph idx="1"/>
-          </p:nvPr>
-        </p:nvSpPr>
-        <p:spPr/>
-        <p:txBody>
-          <a:bodyPr/>
+            <p:ph type="sldNum" sz="quarter" idx="12"/>
+          </p:nvPr>
+        </p:nvSpPr>
+        <p:spPr>
+          <a:xfrm>
+            <a:off x="8778239" y="6455664"/>
+            <a:ext cx="336042" cy="365125"/>
+          </a:xfrm>
+        </p:spPr>
+        <p:txBody>
+          <a:bodyPr vert="horz" lIns="91440" tIns="45720" rIns="91440" bIns="45720" rtlCol="0" anchor="ctr">
+            <a:normAutofit/>
+          </a:bodyPr>
           <a:lstStyle/>
           <a:p>
             <a:pPr>
-              <a:buNone/>
+              <a:spcAft>
+                <a:spcPts val="600"/>
+              </a:spcAft>
             </a:pPr>
-            <a:endParaRPr lang="en-US" dirty="0">
-              <a:latin typeface="Times New Roman" panose="02020603050405020304" pitchFamily="18" charset="0"/>
-              <a:cs typeface="Times New Roman" panose="02020603050405020304" pitchFamily="18" charset="0"/>
-            </a:endParaRPr>
-          </a:p>
-        </p:txBody>
-      </p:sp>
-      <p:sp>
-        <p:nvSpPr>
-          <p:cNvPr id="4" name="Slide Number Placeholder 3"/>
-          <p:cNvSpPr>
-            <a:spLocks noGrp="1"/>
-          </p:cNvSpPr>
-          <p:nvPr>
-            <p:ph type="sldNum" sz="quarter" idx="12"/>
-          </p:nvPr>
-        </p:nvSpPr>
-        <p:spPr/>
-        <p:txBody>
-          <a:bodyPr/>
-          <a:lstStyle/>
-          <a:p>
             <a:fld id="{DC2A8C5E-5ACC-4DAB-B41C-5718F8C58B6D}" type="slidenum">
-              <a:rPr lang="en-US" smtClean="0">
-                <a:latin typeface="Times New Roman" panose="02020603050405020304" pitchFamily="18" charset="0"/>
-                <a:cs typeface="Times New Roman" panose="02020603050405020304" pitchFamily="18" charset="0"/>
+              <a:rPr lang="en-US" sz="1000">
+                <a:solidFill>
+                  <a:schemeClr val="tx1">
+                    <a:lumMod val="50000"/>
+                    <a:lumOff val="50000"/>
+                  </a:schemeClr>
+                </a:solidFill>
               </a:rPr>
-              <a:pPr/>
+              <a:pPr>
+                <a:spcAft>
+                  <a:spcPts val="600"/>
+                </a:spcAft>
+              </a:pPr>
               <a:t>12</a:t>
             </a:fld>
-            <a:endParaRPr lang="en-US">
-              <a:latin typeface="Times New Roman" panose="02020603050405020304" pitchFamily="18" charset="0"/>
-              <a:cs typeface="Times New Roman" panose="02020603050405020304" pitchFamily="18" charset="0"/>
+            <a:endParaRPr lang="en-US" sz="1000">
+              <a:solidFill>
+                <a:schemeClr val="tx1">
+                  <a:lumMod val="50000"/>
+                  <a:lumOff val="50000"/>
+                </a:schemeClr>
+              </a:solidFill>
             </a:endParaRPr>
           </a:p>
         </p:txBody>
       </p:sp>
     </p:spTree>
+    <p:extLst>
+      <p:ext uri="{BB962C8B-B14F-4D97-AF65-F5344CB8AC3E}">
+        <p14:creationId xmlns:p14="http://schemas.microsoft.com/office/powerpoint/2010/main" val="3221300072"/>
+      </p:ext>
+    </p:extLst>
   </p:cSld>
   <p:clrMapOvr>
     <a:masterClrMapping/>
@@ -4721,9 +5487,23 @@
 <file path=ppt/slides/slide13.xml><?xml version="1.0" encoding="utf-8"?>
 <p:sld xmlns:a="http://schemas.openxmlformats.org/drawingml/2006/main" xmlns:r="http://schemas.openxmlformats.org/officeDocument/2006/relationships" xmlns:p="http://schemas.openxmlformats.org/presentationml/2006/main">
   <p:cSld>
+    <p:bg>
+      <p:bgPr>
+        <a:solidFill>
+          <a:schemeClr val="bg1"/>
+        </a:solidFill>
+        <a:effectLst/>
+      </p:bgPr>
+    </p:bg>
     <p:spTree>
       <p:nvGrpSpPr>
-        <p:cNvPr id="1" name=""/>
+        <p:cNvPr id="1" name="">
+          <a:extLst>
+            <a:ext uri="{FF2B5EF4-FFF2-40B4-BE49-F238E27FC236}">
+              <a16:creationId xmlns:a16="http://schemas.microsoft.com/office/drawing/2014/main" id="{7FE44EFF-0F6B-C9AF-3199-3AE675C3FDAB}"/>
+            </a:ext>
+          </a:extLst>
+        </p:cNvPr>
         <p:cNvGrpSpPr/>
         <p:nvPr/>
       </p:nvGrpSpPr>
@@ -4735,9 +5515,488 @@
           <a:chExt cx="0" cy="0"/>
         </a:xfrm>
       </p:grpSpPr>
-      <p:sp>
-        <p:nvSpPr>
-          <p:cNvPr id="2" name="Title 1"/>
+      <p:sp useBgFill="1">
+        <p:nvSpPr>
+          <p:cNvPr id="35" name="Rectangle 34">
+            <a:extLst>
+              <a:ext uri="{FF2B5EF4-FFF2-40B4-BE49-F238E27FC236}">
+                <a16:creationId xmlns:a16="http://schemas.microsoft.com/office/drawing/2014/main" id="{A8384FB5-9ADC-4DDC-881B-597D56F5B15D}"/>
+              </a:ext>
+              <a:ext uri="{C183D7F6-B498-43B3-948B-1728B52AA6E4}">
+                <adec:decorative xmlns:adec="http://schemas.microsoft.com/office/drawing/2017/decorative" val="1"/>
+              </a:ext>
+            </a:extLst>
+          </p:cNvPr>
+          <p:cNvSpPr>
+            <a:spLocks noGrp="1" noRot="1" noChangeAspect="1" noMove="1" noResize="1" noEditPoints="1" noAdjustHandles="1" noChangeArrowheads="1" noChangeShapeType="1" noTextEdit="1"/>
+          </p:cNvSpPr>
+          <p:nvPr>
+            <p:extLst>
+              <p:ext uri="{386F3935-93C4-4BCD-93E2-E3B085C9AB24}">
+                <p16:designElem xmlns:p16="http://schemas.microsoft.com/office/powerpoint/2015/main" val="1"/>
+              </p:ext>
+            </p:extLst>
+          </p:nvPr>
+        </p:nvSpPr>
+        <p:spPr>
+          <a:xfrm>
+            <a:off x="0" y="0"/>
+            <a:ext cx="9144000" cy="6858000"/>
+          </a:xfrm>
+          <a:prstGeom prst="rect">
+            <a:avLst/>
+          </a:prstGeom>
+          <a:ln w="12700" cap="flat" cmpd="sng" algn="ctr">
+            <a:noFill/>
+            <a:prstDash val="solid"/>
+            <a:miter lim="800000"/>
+          </a:ln>
+          <a:effectLst/>
+          <a:extLst>
+            <a:ext uri="{91240B29-F687-4F45-9708-019B960494DF}">
+              <a14:hiddenLine xmlns:a14="http://schemas.microsoft.com/office/drawing/2010/main" w="12700" cap="flat" cmpd="sng" algn="ctr">
+                <a:solidFill>
+                  <a:schemeClr val="accent1">
+                    <a:shade val="50000"/>
+                  </a:schemeClr>
+                </a:solidFill>
+                <a:prstDash val="solid"/>
+                <a:miter lim="800000"/>
+              </a14:hiddenLine>
+            </a:ext>
+          </a:extLst>
+        </p:spPr>
+        <p:style>
+          <a:lnRef idx="2">
+            <a:schemeClr val="accent1">
+              <a:shade val="50000"/>
+            </a:schemeClr>
+          </a:lnRef>
+          <a:fillRef idx="1">
+            <a:schemeClr val="accent1"/>
+          </a:fillRef>
+          <a:effectRef idx="0">
+            <a:schemeClr val="accent1"/>
+          </a:effectRef>
+          <a:fontRef idx="minor">
+            <a:schemeClr val="lt1"/>
+          </a:fontRef>
+        </p:style>
+        <p:txBody>
+          <a:bodyPr rtlCol="0" anchor="ctr"/>
+          <a:lstStyle/>
+          <a:p>
+            <a:pPr algn="ctr"/>
+            <a:endParaRPr lang="en-US"/>
+          </a:p>
+        </p:txBody>
+      </p:sp>
+      <p:sp>
+        <p:nvSpPr>
+          <p:cNvPr id="37" name="Rectangle 36">
+            <a:extLst>
+              <a:ext uri="{FF2B5EF4-FFF2-40B4-BE49-F238E27FC236}">
+                <a16:creationId xmlns:a16="http://schemas.microsoft.com/office/drawing/2014/main" id="{91E5A9A7-95C6-4F4F-B00E-C82E07FE62EF}"/>
+              </a:ext>
+              <a:ext uri="{C183D7F6-B498-43B3-948B-1728B52AA6E4}">
+                <adec:decorative xmlns:adec="http://schemas.microsoft.com/office/drawing/2017/decorative" val="1"/>
+              </a:ext>
+            </a:extLst>
+          </p:cNvPr>
+          <p:cNvSpPr>
+            <a:spLocks noGrp="1" noRot="1" noChangeAspect="1" noMove="1" noResize="1" noEditPoints="1" noAdjustHandles="1" noChangeArrowheads="1" noChangeShapeType="1" noTextEdit="1"/>
+          </p:cNvSpPr>
+          <p:nvPr>
+            <p:extLst>
+              <p:ext uri="{386F3935-93C4-4BCD-93E2-E3B085C9AB24}">
+                <p16:designElem xmlns:p16="http://schemas.microsoft.com/office/powerpoint/2015/main" val="1"/>
+              </p:ext>
+            </p:extLst>
+          </p:nvPr>
+        </p:nvSpPr>
+        <p:spPr>
+          <a:xfrm rot="5400000" flipH="1">
+            <a:off x="-1922632" y="1922631"/>
+            <a:ext cx="6875818" cy="3030558"/>
+          </a:xfrm>
+          <a:prstGeom prst="rect">
+            <a:avLst/>
+          </a:prstGeom>
+          <a:gradFill>
+            <a:gsLst>
+              <a:gs pos="0">
+                <a:srgbClr val="000000"/>
+              </a:gs>
+              <a:gs pos="100000">
+                <a:schemeClr val="accent1">
+                  <a:lumMod val="75000"/>
+                </a:schemeClr>
+              </a:gs>
+            </a:gsLst>
+            <a:lin ang="18600000" scaled="0"/>
+          </a:gradFill>
+          <a:ln>
+            <a:noFill/>
+          </a:ln>
+        </p:spPr>
+        <p:style>
+          <a:lnRef idx="2">
+            <a:schemeClr val="accent1">
+              <a:shade val="50000"/>
+            </a:schemeClr>
+          </a:lnRef>
+          <a:fillRef idx="1">
+            <a:schemeClr val="accent1"/>
+          </a:fillRef>
+          <a:effectRef idx="0">
+            <a:schemeClr val="accent1"/>
+          </a:effectRef>
+          <a:fontRef idx="minor">
+            <a:schemeClr val="lt1"/>
+          </a:fontRef>
+        </p:style>
+        <p:txBody>
+          <a:bodyPr rtlCol="0" anchor="ctr"/>
+          <a:lstStyle/>
+          <a:p>
+            <a:pPr algn="ctr"/>
+            <a:endParaRPr lang="en-US" dirty="0"/>
+          </a:p>
+        </p:txBody>
+      </p:sp>
+      <p:sp>
+        <p:nvSpPr>
+          <p:cNvPr id="39" name="Rectangle 38">
+            <a:extLst>
+              <a:ext uri="{FF2B5EF4-FFF2-40B4-BE49-F238E27FC236}">
+                <a16:creationId xmlns:a16="http://schemas.microsoft.com/office/drawing/2014/main" id="{D07DD2DE-F619-49DD-B5E7-03A290FF4ED1}"/>
+              </a:ext>
+              <a:ext uri="{C183D7F6-B498-43B3-948B-1728B52AA6E4}">
+                <adec:decorative xmlns:adec="http://schemas.microsoft.com/office/drawing/2017/decorative" val="1"/>
+              </a:ext>
+            </a:extLst>
+          </p:cNvPr>
+          <p:cNvSpPr>
+            <a:spLocks noGrp="1" noRot="1" noChangeAspect="1" noMove="1" noResize="1" noEditPoints="1" noAdjustHandles="1" noChangeArrowheads="1" noChangeShapeType="1" noTextEdit="1"/>
+          </p:cNvSpPr>
+          <p:nvPr>
+            <p:extLst>
+              <p:ext uri="{386F3935-93C4-4BCD-93E2-E3B085C9AB24}">
+                <p16:designElem xmlns:p16="http://schemas.microsoft.com/office/powerpoint/2015/main" val="1"/>
+              </p:ext>
+            </p:extLst>
+          </p:nvPr>
+        </p:nvSpPr>
+        <p:spPr>
+          <a:xfrm rot="16200000">
+            <a:off x="-663321" y="3165298"/>
+            <a:ext cx="4355594" cy="3028952"/>
+          </a:xfrm>
+          <a:prstGeom prst="rect">
+            <a:avLst/>
+          </a:prstGeom>
+          <a:gradFill>
+            <a:gsLst>
+              <a:gs pos="0">
+                <a:schemeClr val="accent1">
+                  <a:alpha val="50000"/>
+                </a:schemeClr>
+              </a:gs>
+              <a:gs pos="100000">
+                <a:schemeClr val="accent1">
+                  <a:lumMod val="50000"/>
+                  <a:alpha val="0"/>
+                </a:schemeClr>
+              </a:gs>
+            </a:gsLst>
+            <a:lin ang="11400000" scaled="0"/>
+          </a:gradFill>
+          <a:ln>
+            <a:noFill/>
+          </a:ln>
+        </p:spPr>
+        <p:style>
+          <a:lnRef idx="2">
+            <a:schemeClr val="accent1">
+              <a:shade val="50000"/>
+            </a:schemeClr>
+          </a:lnRef>
+          <a:fillRef idx="1">
+            <a:schemeClr val="accent1"/>
+          </a:fillRef>
+          <a:effectRef idx="0">
+            <a:schemeClr val="accent1"/>
+          </a:effectRef>
+          <a:fontRef idx="minor">
+            <a:schemeClr val="lt1"/>
+          </a:fontRef>
+        </p:style>
+        <p:txBody>
+          <a:bodyPr rtlCol="0" anchor="ctr"/>
+          <a:lstStyle/>
+          <a:p>
+            <a:pPr algn="ctr"/>
+            <a:endParaRPr lang="en-US"/>
+          </a:p>
+        </p:txBody>
+      </p:sp>
+      <p:sp>
+        <p:nvSpPr>
+          <p:cNvPr id="41" name="Rectangle 40">
+            <a:extLst>
+              <a:ext uri="{FF2B5EF4-FFF2-40B4-BE49-F238E27FC236}">
+                <a16:creationId xmlns:a16="http://schemas.microsoft.com/office/drawing/2014/main" id="{85149191-5F60-4A28-AAFF-039F96B0F3EC}"/>
+              </a:ext>
+              <a:ext uri="{C183D7F6-B498-43B3-948B-1728B52AA6E4}">
+                <adec:decorative xmlns:adec="http://schemas.microsoft.com/office/drawing/2017/decorative" val="1"/>
+              </a:ext>
+            </a:extLst>
+          </p:cNvPr>
+          <p:cNvSpPr>
+            <a:spLocks noGrp="1" noRot="1" noChangeAspect="1" noMove="1" noResize="1" noEditPoints="1" noAdjustHandles="1" noChangeArrowheads="1" noChangeShapeType="1" noTextEdit="1"/>
+          </p:cNvSpPr>
+          <p:nvPr>
+            <p:extLst>
+              <p:ext uri="{386F3935-93C4-4BCD-93E2-E3B085C9AB24}">
+                <p16:designElem xmlns:p16="http://schemas.microsoft.com/office/powerpoint/2015/main" val="1"/>
+              </p:ext>
+            </p:extLst>
+          </p:nvPr>
+        </p:nvSpPr>
+        <p:spPr>
+          <a:xfrm rot="16200000" flipH="1">
+            <a:off x="-1742858" y="2085760"/>
+            <a:ext cx="6857572" cy="2686051"/>
+          </a:xfrm>
+          <a:prstGeom prst="rect">
+            <a:avLst/>
+          </a:prstGeom>
+          <a:gradFill>
+            <a:gsLst>
+              <a:gs pos="0">
+                <a:srgbClr val="000000">
+                  <a:alpha val="59000"/>
+                </a:srgbClr>
+              </a:gs>
+              <a:gs pos="69000">
+                <a:schemeClr val="accent1">
+                  <a:alpha val="0"/>
+                </a:schemeClr>
+              </a:gs>
+            </a:gsLst>
+            <a:lin ang="13200000" scaled="0"/>
+          </a:gradFill>
+          <a:ln>
+            <a:noFill/>
+          </a:ln>
+        </p:spPr>
+        <p:style>
+          <a:lnRef idx="2">
+            <a:schemeClr val="accent1">
+              <a:shade val="50000"/>
+            </a:schemeClr>
+          </a:lnRef>
+          <a:fillRef idx="1">
+            <a:schemeClr val="accent1"/>
+          </a:fillRef>
+          <a:effectRef idx="0">
+            <a:schemeClr val="accent1"/>
+          </a:effectRef>
+          <a:fontRef idx="minor">
+            <a:schemeClr val="lt1"/>
+          </a:fontRef>
+        </p:style>
+        <p:txBody>
+          <a:bodyPr rtlCol="0" anchor="ctr"/>
+          <a:lstStyle/>
+          <a:p>
+            <a:pPr algn="ctr"/>
+            <a:endParaRPr lang="en-US" dirty="0"/>
+          </a:p>
+        </p:txBody>
+      </p:sp>
+      <p:sp>
+        <p:nvSpPr>
+          <p:cNvPr id="43" name="Freeform: Shape 42">
+            <a:extLst>
+              <a:ext uri="{FF2B5EF4-FFF2-40B4-BE49-F238E27FC236}">
+                <a16:creationId xmlns:a16="http://schemas.microsoft.com/office/drawing/2014/main" id="{F8260ED5-17F7-4158-B241-D51DD4CF1B7E}"/>
+              </a:ext>
+              <a:ext uri="{C183D7F6-B498-43B3-948B-1728B52AA6E4}">
+                <adec:decorative xmlns:adec="http://schemas.microsoft.com/office/drawing/2017/decorative" val="1"/>
+              </a:ext>
+            </a:extLst>
+          </p:cNvPr>
+          <p:cNvSpPr>
+            <a:spLocks noGrp="1" noRot="1" noChangeAspect="1" noMove="1" noResize="1" noEditPoints="1" noAdjustHandles="1" noChangeArrowheads="1" noChangeShapeType="1" noTextEdit="1"/>
+          </p:cNvSpPr>
+          <p:nvPr>
+            <p:extLst>
+              <p:ext uri="{386F3935-93C4-4BCD-93E2-E3B085C9AB24}">
+                <p16:designElem xmlns:p16="http://schemas.microsoft.com/office/powerpoint/2015/main" val="1"/>
+              </p:ext>
+            </p:extLst>
+          </p:nvPr>
+        </p:nvSpPr>
+        <p:spPr>
+          <a:xfrm rot="6097846">
+            <a:off x="-1161554" y="1712395"/>
+            <a:ext cx="4808302" cy="3066500"/>
+          </a:xfrm>
+          <a:custGeom>
+            <a:avLst/>
+            <a:gdLst>
+              <a:gd name="connsiteX0" fmla="*/ 48844 w 4808302"/>
+              <a:gd name="connsiteY0" fmla="*/ 2888671 h 4088666"/>
+              <a:gd name="connsiteX1" fmla="*/ 0 w 4808302"/>
+              <a:gd name="connsiteY1" fmla="*/ 2404151 h 4088666"/>
+              <a:gd name="connsiteX2" fmla="*/ 2404151 w 4808302"/>
+              <a:gd name="connsiteY2" fmla="*/ 0 h 4088666"/>
+              <a:gd name="connsiteX3" fmla="*/ 4808302 w 4808302"/>
+              <a:gd name="connsiteY3" fmla="*/ 2404151 h 4088666"/>
+              <a:gd name="connsiteX4" fmla="*/ 4700216 w 4808302"/>
+              <a:gd name="connsiteY4" fmla="*/ 3119072 h 4088666"/>
+              <a:gd name="connsiteX5" fmla="*/ 4643143 w 4808302"/>
+              <a:gd name="connsiteY5" fmla="*/ 3275009 h 4088666"/>
+              <a:gd name="connsiteX6" fmla="*/ 690093 w 4808302"/>
+              <a:gd name="connsiteY6" fmla="*/ 4088666 h 4088666"/>
+              <a:gd name="connsiteX7" fmla="*/ 548991 w 4808302"/>
+              <a:gd name="connsiteY7" fmla="*/ 3933414 h 4088666"/>
+              <a:gd name="connsiteX8" fmla="*/ 48844 w 4808302"/>
+              <a:gd name="connsiteY8" fmla="*/ 2888671 h 4088666"/>
+            </a:gdLst>
+            <a:ahLst/>
+            <a:cxnLst>
+              <a:cxn ang="0">
+                <a:pos x="connsiteX0" y="connsiteY0"/>
+              </a:cxn>
+              <a:cxn ang="0">
+                <a:pos x="connsiteX1" y="connsiteY1"/>
+              </a:cxn>
+              <a:cxn ang="0">
+                <a:pos x="connsiteX2" y="connsiteY2"/>
+              </a:cxn>
+              <a:cxn ang="0">
+                <a:pos x="connsiteX3" y="connsiteY3"/>
+              </a:cxn>
+              <a:cxn ang="0">
+                <a:pos x="connsiteX4" y="connsiteY4"/>
+              </a:cxn>
+              <a:cxn ang="0">
+                <a:pos x="connsiteX5" y="connsiteY5"/>
+              </a:cxn>
+              <a:cxn ang="0">
+                <a:pos x="connsiteX6" y="connsiteY6"/>
+              </a:cxn>
+              <a:cxn ang="0">
+                <a:pos x="connsiteX7" y="connsiteY7"/>
+              </a:cxn>
+              <a:cxn ang="0">
+                <a:pos x="connsiteX8" y="connsiteY8"/>
+              </a:cxn>
+            </a:cxnLst>
+            <a:rect l="l" t="t" r="r" b="b"/>
+            <a:pathLst>
+              <a:path w="4808302" h="4088666">
+                <a:moveTo>
+                  <a:pt x="48844" y="2888671"/>
+                </a:moveTo>
+                <a:cubicBezTo>
+                  <a:pt x="16818" y="2732167"/>
+                  <a:pt x="0" y="2570123"/>
+                  <a:pt x="0" y="2404151"/>
+                </a:cubicBezTo>
+                <a:cubicBezTo>
+                  <a:pt x="0" y="1076375"/>
+                  <a:pt x="1076375" y="0"/>
+                  <a:pt x="2404151" y="0"/>
+                </a:cubicBezTo>
+                <a:cubicBezTo>
+                  <a:pt x="3731927" y="0"/>
+                  <a:pt x="4808302" y="1076375"/>
+                  <a:pt x="4808302" y="2404151"/>
+                </a:cubicBezTo>
+                <a:cubicBezTo>
+                  <a:pt x="4808302" y="2653109"/>
+                  <a:pt x="4770461" y="2893229"/>
+                  <a:pt x="4700216" y="3119072"/>
+                </a:cubicBezTo>
+                <a:lnTo>
+                  <a:pt x="4643143" y="3275009"/>
+                </a:lnTo>
+                <a:lnTo>
+                  <a:pt x="690093" y="4088666"/>
+                </a:lnTo>
+                <a:lnTo>
+                  <a:pt x="548991" y="3933414"/>
+                </a:lnTo>
+                <a:cubicBezTo>
+                  <a:pt x="304015" y="3636572"/>
+                  <a:pt x="128908" y="3279932"/>
+                  <a:pt x="48844" y="2888671"/>
+                </a:cubicBezTo>
+                <a:close/>
+              </a:path>
+            </a:pathLst>
+          </a:custGeom>
+          <a:gradFill>
+            <a:gsLst>
+              <a:gs pos="39000">
+                <a:schemeClr val="accent1">
+                  <a:lumMod val="60000"/>
+                  <a:lumOff val="40000"/>
+                  <a:alpha val="0"/>
+                </a:schemeClr>
+              </a:gs>
+              <a:gs pos="100000">
+                <a:schemeClr val="accent1">
+                  <a:lumMod val="75000"/>
+                  <a:alpha val="26000"/>
+                </a:schemeClr>
+              </a:gs>
+            </a:gsLst>
+            <a:lin ang="18600000" scaled="0"/>
+          </a:gradFill>
+          <a:ln>
+            <a:noFill/>
+          </a:ln>
+        </p:spPr>
+        <p:style>
+          <a:lnRef idx="2">
+            <a:schemeClr val="accent1">
+              <a:shade val="50000"/>
+            </a:schemeClr>
+          </a:lnRef>
+          <a:fillRef idx="1">
+            <a:schemeClr val="accent1"/>
+          </a:fillRef>
+          <a:effectRef idx="0">
+            <a:schemeClr val="accent1"/>
+          </a:effectRef>
+          <a:fontRef idx="minor">
+            <a:schemeClr val="lt1"/>
+          </a:fontRef>
+        </p:style>
+        <p:txBody>
+          <a:bodyPr wrap="square" rtlCol="0" anchor="ctr">
+            <a:noAutofit/>
+          </a:bodyPr>
+          <a:lstStyle/>
+          <a:p>
+            <a:pPr algn="ctr"/>
+            <a:endParaRPr lang="en-US" dirty="0"/>
+          </a:p>
+        </p:txBody>
+      </p:sp>
+      <p:sp>
+        <p:nvSpPr>
+          <p:cNvPr id="2" name="Title 1">
+            <a:extLst>
+              <a:ext uri="{FF2B5EF4-FFF2-40B4-BE49-F238E27FC236}">
+                <a16:creationId xmlns:a16="http://schemas.microsoft.com/office/drawing/2014/main" id="{A902BF81-3ABD-413C-A31D-82FFF10F5077}"/>
+              </a:ext>
+            </a:extLst>
+          </p:cNvPr>
           <p:cNvSpPr>
             <a:spLocks noGrp="1"/>
           </p:cNvSpPr>
@@ -4745,78 +6004,163 @@
             <p:ph type="title"/>
           </p:nvPr>
         </p:nvSpPr>
-        <p:spPr/>
-        <p:txBody>
-          <a:bodyPr/>
-          <a:lstStyle/>
-          <a:p>
-            <a:pPr algn="l"/>
-            <a:r>
-              <a:rPr lang="en-US" dirty="0">
-                <a:latin typeface="Times New Roman" panose="02020603050405020304" pitchFamily="18" charset="0"/>
-                <a:cs typeface="Times New Roman" panose="02020603050405020304" pitchFamily="18" charset="0"/>
+        <p:spPr>
+          <a:xfrm>
+            <a:off x="495030" y="2767106"/>
+            <a:ext cx="2160621" cy="3071906"/>
+          </a:xfrm>
+        </p:spPr>
+        <p:txBody>
+          <a:bodyPr vert="horz" lIns="91440" tIns="45720" rIns="91440" bIns="45720" rtlCol="0" anchor="t">
+            <a:normAutofit/>
+          </a:bodyPr>
+          <a:lstStyle/>
+          <a:p>
+            <a:pPr algn="l">
+              <a:lnSpc>
+                <a:spcPct val="90000"/>
+              </a:lnSpc>
+            </a:pPr>
+            <a:r>
+              <a:rPr lang="en-US" sz="3500" kern="1200" dirty="0">
+                <a:solidFill>
+                  <a:srgbClr val="FFFFFF"/>
+                </a:solidFill>
+                <a:latin typeface="+mj-lt"/>
+                <a:ea typeface="+mj-ea"/>
+                <a:cs typeface="+mj-cs"/>
               </a:rPr>
-              <a:t>Deployment Diagram </a:t>
-            </a:r>
-          </a:p>
-        </p:txBody>
-      </p:sp>
-      <p:sp>
-        <p:nvSpPr>
-          <p:cNvPr id="3" name="Content Placeholder 2"/>
+              <a:t>State </a:t>
+            </a:r>
+            <a:r>
+              <a:rPr lang="en-US" sz="3500" kern="1200">
+                <a:solidFill>
+                  <a:srgbClr val="FFFFFF"/>
+                </a:solidFill>
+                <a:latin typeface="+mj-lt"/>
+                <a:ea typeface="+mj-ea"/>
+                <a:cs typeface="+mj-cs"/>
+              </a:rPr>
+              <a:t>Transition </a:t>
+            </a:r>
+            <a:r>
+              <a:rPr lang="en-US" sz="3500" kern="1200" dirty="0">
+                <a:solidFill>
+                  <a:srgbClr val="FFFFFF"/>
+                </a:solidFill>
+                <a:latin typeface="+mj-lt"/>
+                <a:ea typeface="+mj-ea"/>
+                <a:cs typeface="+mj-cs"/>
+              </a:rPr>
+              <a:t>Diagram</a:t>
+            </a:r>
+          </a:p>
+        </p:txBody>
+      </p:sp>
+      <p:pic>
+        <p:nvPicPr>
+          <p:cNvPr id="7" name="Content Placeholder 6" descr="A diagram of a process&#10;&#10;Description automatically generated">
+            <a:extLst>
+              <a:ext uri="{FF2B5EF4-FFF2-40B4-BE49-F238E27FC236}">
+                <a16:creationId xmlns:a16="http://schemas.microsoft.com/office/drawing/2014/main" id="{D080B5D5-C376-E1C0-A813-BFE0003EED10}"/>
+              </a:ext>
+            </a:extLst>
+          </p:cNvPr>
+          <p:cNvPicPr>
+            <a:picLocks noGrp="1" noChangeAspect="1"/>
+          </p:cNvPicPr>
+          <p:nvPr>
+            <p:ph idx="1"/>
+          </p:nvPr>
+        </p:nvPicPr>
+        <p:blipFill>
+          <a:blip r:embed="rId2">
+            <a:extLst>
+              <a:ext uri="{28A0092B-C50C-407E-A947-70E740481C1C}">
+                <a14:useLocalDpi xmlns:a14="http://schemas.microsoft.com/office/drawing/2010/main" val="0"/>
+              </a:ext>
+            </a:extLst>
+          </a:blip>
+          <a:stretch>
+            <a:fillRect/>
+          </a:stretch>
+        </p:blipFill>
+        <p:spPr>
+          <a:xfrm>
+            <a:off x="3642998" y="467208"/>
+            <a:ext cx="4886956" cy="5923584"/>
+          </a:xfrm>
+          <a:prstGeom prst="rect">
+            <a:avLst/>
+          </a:prstGeom>
+        </p:spPr>
+      </p:pic>
+      <p:sp>
+        <p:nvSpPr>
+          <p:cNvPr id="4" name="Slide Number Placeholder 3">
+            <a:extLst>
+              <a:ext uri="{FF2B5EF4-FFF2-40B4-BE49-F238E27FC236}">
+                <a16:creationId xmlns:a16="http://schemas.microsoft.com/office/drawing/2014/main" id="{9E40995C-71DE-0F8E-C133-C89CAF6FA6E6}"/>
+              </a:ext>
+            </a:extLst>
+          </p:cNvPr>
           <p:cNvSpPr>
             <a:spLocks noGrp="1"/>
           </p:cNvSpPr>
           <p:nvPr>
-            <p:ph idx="1"/>
-          </p:nvPr>
-        </p:nvSpPr>
-        <p:spPr/>
-        <p:txBody>
-          <a:bodyPr/>
+            <p:ph type="sldNum" sz="quarter" idx="12"/>
+          </p:nvPr>
+        </p:nvSpPr>
+        <p:spPr>
+          <a:xfrm>
+            <a:off x="8778239" y="6455664"/>
+            <a:ext cx="336042" cy="365125"/>
+          </a:xfrm>
+        </p:spPr>
+        <p:txBody>
+          <a:bodyPr vert="horz" lIns="91440" tIns="45720" rIns="91440" bIns="45720" rtlCol="0" anchor="ctr">
+            <a:normAutofit/>
+          </a:bodyPr>
           <a:lstStyle/>
           <a:p>
             <a:pPr>
-              <a:buNone/>
+              <a:spcAft>
+                <a:spcPts val="600"/>
+              </a:spcAft>
             </a:pPr>
-            <a:endParaRPr lang="en-US" dirty="0">
-              <a:latin typeface="Times New Roman" panose="02020603050405020304" pitchFamily="18" charset="0"/>
-              <a:cs typeface="Times New Roman" panose="02020603050405020304" pitchFamily="18" charset="0"/>
-            </a:endParaRPr>
-          </a:p>
-        </p:txBody>
-      </p:sp>
-      <p:sp>
-        <p:nvSpPr>
-          <p:cNvPr id="4" name="Slide Number Placeholder 3"/>
-          <p:cNvSpPr>
-            <a:spLocks noGrp="1"/>
-          </p:cNvSpPr>
-          <p:nvPr>
-            <p:ph type="sldNum" sz="quarter" idx="12"/>
-          </p:nvPr>
-        </p:nvSpPr>
-        <p:spPr/>
-        <p:txBody>
-          <a:bodyPr/>
-          <a:lstStyle/>
-          <a:p>
             <a:fld id="{DC2A8C5E-5ACC-4DAB-B41C-5718F8C58B6D}" type="slidenum">
-              <a:rPr lang="en-US" smtClean="0">
-                <a:latin typeface="Times New Roman" panose="02020603050405020304" pitchFamily="18" charset="0"/>
-                <a:cs typeface="Times New Roman" panose="02020603050405020304" pitchFamily="18" charset="0"/>
+              <a:rPr lang="en-US" sz="1000">
+                <a:solidFill>
+                  <a:schemeClr val="tx1">
+                    <a:lumMod val="50000"/>
+                    <a:lumOff val="50000"/>
+                  </a:schemeClr>
+                </a:solidFill>
               </a:rPr>
-              <a:pPr/>
+              <a:pPr>
+                <a:spcAft>
+                  <a:spcPts val="600"/>
+                </a:spcAft>
+              </a:pPr>
               <a:t>13</a:t>
             </a:fld>
-            <a:endParaRPr lang="en-US">
-              <a:latin typeface="Times New Roman" panose="02020603050405020304" pitchFamily="18" charset="0"/>
-              <a:cs typeface="Times New Roman" panose="02020603050405020304" pitchFamily="18" charset="0"/>
+            <a:endParaRPr lang="en-US" sz="1000">
+              <a:solidFill>
+                <a:schemeClr val="tx1">
+                  <a:lumMod val="50000"/>
+                  <a:lumOff val="50000"/>
+                </a:schemeClr>
+              </a:solidFill>
             </a:endParaRPr>
           </a:p>
         </p:txBody>
       </p:sp>
     </p:spTree>
+    <p:extLst>
+      <p:ext uri="{BB962C8B-B14F-4D97-AF65-F5344CB8AC3E}">
+        <p14:creationId xmlns:p14="http://schemas.microsoft.com/office/powerpoint/2010/main" val="2434548152"/>
+      </p:ext>
+    </p:extLst>
   </p:cSld>
   <p:clrMapOvr>
     <a:masterClrMapping/>
@@ -4853,9 +6197,7 @@
         </p:nvSpPr>
         <p:spPr/>
         <p:txBody>
-          <a:bodyPr>
-            <a:normAutofit/>
-          </a:bodyPr>
+          <a:bodyPr/>
           <a:lstStyle/>
           <a:p>
             <a:pPr algn="l"/>
@@ -4864,50 +6206,46 @@
                 <a:latin typeface="Times New Roman" panose="02020603050405020304" pitchFamily="18" charset="0"/>
                 <a:cs typeface="Times New Roman" panose="02020603050405020304" pitchFamily="18" charset="0"/>
               </a:rPr>
-              <a:t>Decision Table, </a:t>
-            </a:r>
-            <a:r>
-              <a:rPr lang="en-US" dirty="0" err="1">
-                <a:latin typeface="Times New Roman" panose="02020603050405020304" pitchFamily="18" charset="0"/>
-                <a:cs typeface="Times New Roman" panose="02020603050405020304" pitchFamily="18" charset="0"/>
-              </a:rPr>
-              <a:t>Pseudocode</a:t>
-            </a:r>
-            <a:r>
-              <a:rPr lang="en-US" dirty="0">
-                <a:latin typeface="Times New Roman" panose="02020603050405020304" pitchFamily="18" charset="0"/>
-                <a:cs typeface="Times New Roman" panose="02020603050405020304" pitchFamily="18" charset="0"/>
-              </a:rPr>
-              <a:t> </a:t>
-            </a:r>
-          </a:p>
-        </p:txBody>
-      </p:sp>
-      <p:sp>
-        <p:nvSpPr>
-          <p:cNvPr id="3" name="Content Placeholder 2"/>
-          <p:cNvSpPr>
-            <a:spLocks noGrp="1"/>
-          </p:cNvSpPr>
+              <a:t>Schedule </a:t>
+            </a:r>
+          </a:p>
+        </p:txBody>
+      </p:sp>
+      <p:pic>
+        <p:nvPicPr>
+          <p:cNvPr id="6" name="Content Placeholder 5" descr="A screenshot of a computer&#10;&#10;Description automatically generated">
+            <a:extLst>
+              <a:ext uri="{FF2B5EF4-FFF2-40B4-BE49-F238E27FC236}">
+                <a16:creationId xmlns:a16="http://schemas.microsoft.com/office/drawing/2014/main" id="{716787A7-A762-93A7-1013-8ACC1FA32AA1}"/>
+              </a:ext>
+            </a:extLst>
+          </p:cNvPr>
+          <p:cNvPicPr>
+            <a:picLocks noGrp="1" noChangeAspect="1"/>
+          </p:cNvPicPr>
           <p:nvPr>
             <p:ph idx="1"/>
           </p:nvPr>
-        </p:nvSpPr>
-        <p:spPr/>
-        <p:txBody>
-          <a:bodyPr/>
-          <a:lstStyle/>
-          <a:p>
-            <a:pPr>
-              <a:buNone/>
-            </a:pPr>
-            <a:endParaRPr lang="en-US" dirty="0">
-              <a:latin typeface="Times New Roman" panose="02020603050405020304" pitchFamily="18" charset="0"/>
-              <a:cs typeface="Times New Roman" panose="02020603050405020304" pitchFamily="18" charset="0"/>
-            </a:endParaRPr>
-          </a:p>
-        </p:txBody>
-      </p:sp>
+        </p:nvPicPr>
+        <p:blipFill>
+          <a:blip r:embed="rId2">
+            <a:extLst>
+              <a:ext uri="{28A0092B-C50C-407E-A947-70E740481C1C}">
+                <a14:useLocalDpi xmlns:a14="http://schemas.microsoft.com/office/drawing/2010/main" val="0"/>
+              </a:ext>
+            </a:extLst>
+          </a:blip>
+          <a:stretch>
+            <a:fillRect/>
+          </a:stretch>
+        </p:blipFill>
+        <p:spPr>
+          <a:xfrm>
+            <a:off x="457200" y="2287019"/>
+            <a:ext cx="8229600" cy="3152325"/>
+          </a:xfrm>
+        </p:spPr>
+      </p:pic>
       <p:sp>
         <p:nvSpPr>
           <p:cNvPr id="4" name="Slide Number Placeholder 3"/>
@@ -4978,38 +6316,26 @@
           <a:bodyPr/>
           <a:lstStyle/>
           <a:p>
-            <a:pPr algn="l"/>
             <a:r>
               <a:rPr lang="en-US" dirty="0">
                 <a:latin typeface="Times New Roman" panose="02020603050405020304" pitchFamily="18" charset="0"/>
                 <a:cs typeface="Times New Roman" panose="02020603050405020304" pitchFamily="18" charset="0"/>
               </a:rPr>
-              <a:t>Schedule </a:t>
-            </a:r>
-          </a:p>
-        </p:txBody>
-      </p:sp>
-      <p:sp>
-        <p:nvSpPr>
-          <p:cNvPr id="3" name="Content Placeholder 2"/>
-          <p:cNvSpPr>
-            <a:spLocks noGrp="1"/>
-          </p:cNvSpPr>
-          <p:nvPr>
-            <p:ph idx="1"/>
-          </p:nvPr>
-        </p:nvSpPr>
-        <p:spPr/>
-        <p:txBody>
-          <a:bodyPr/>
-          <a:lstStyle/>
-          <a:p>
+              <a:t>Details of 1</a:t>
+            </a:r>
+            <a:r>
+              <a:rPr lang="en-US" baseline="30000" dirty="0">
+                <a:latin typeface="Times New Roman" panose="02020603050405020304" pitchFamily="18" charset="0"/>
+                <a:cs typeface="Times New Roman" panose="02020603050405020304" pitchFamily="18" charset="0"/>
+              </a:rPr>
+              <a:t>st</a:t>
+            </a:r>
             <a:r>
               <a:rPr lang="en-US" dirty="0">
                 <a:latin typeface="Times New Roman" panose="02020603050405020304" pitchFamily="18" charset="0"/>
                 <a:cs typeface="Times New Roman" panose="02020603050405020304" pitchFamily="18" charset="0"/>
               </a:rPr>
-              <a:t>Gantt Chart (using any project management tool)</a:t>
+              <a:t> Iteration (30%)</a:t>
             </a:r>
           </a:p>
         </p:txBody>
@@ -5044,7 +6370,314 @@
           </a:p>
         </p:txBody>
       </p:sp>
+      <p:sp>
+        <p:nvSpPr>
+          <p:cNvPr id="5" name="Rectangle 1">
+            <a:extLst>
+              <a:ext uri="{FF2B5EF4-FFF2-40B4-BE49-F238E27FC236}">
+                <a16:creationId xmlns:a16="http://schemas.microsoft.com/office/drawing/2014/main" id="{E11F4F5D-1F38-AA36-3065-AF2DC9F63209}"/>
+              </a:ext>
+            </a:extLst>
+          </p:cNvPr>
+          <p:cNvSpPr>
+            <a:spLocks noGrp="1" noChangeArrowheads="1"/>
+          </p:cNvSpPr>
+          <p:nvPr>
+            <p:ph idx="1"/>
+          </p:nvPr>
+        </p:nvSpPr>
+        <p:spPr bwMode="auto">
+          <a:xfrm>
+            <a:off x="457201" y="2019088"/>
+            <a:ext cx="7848600" cy="3688189"/>
+          </a:xfrm>
+          <a:prstGeom prst="rect">
+            <a:avLst/>
+          </a:prstGeom>
+          <a:noFill/>
+          <a:ln>
+            <a:noFill/>
+          </a:ln>
+          <a:effectLst/>
+          <a:extLst>
+            <a:ext uri="{909E8E84-426E-40DD-AFC4-6F175D3DCCD1}">
+              <a14:hiddenFill xmlns:a14="http://schemas.microsoft.com/office/drawing/2010/main">
+                <a:solidFill>
+                  <a:schemeClr val="accent1"/>
+                </a:solidFill>
+              </a14:hiddenFill>
+            </a:ext>
+            <a:ext uri="{91240B29-F687-4F45-9708-019B960494DF}">
+              <a14:hiddenLine xmlns:a14="http://schemas.microsoft.com/office/drawing/2010/main" w="9525">
+                <a:solidFill>
+                  <a:schemeClr val="tx1"/>
+                </a:solidFill>
+                <a:miter lim="800000"/>
+                <a:headEnd/>
+                <a:tailEnd/>
+              </a14:hiddenLine>
+            </a:ext>
+            <a:ext uri="{AF507438-7753-43E0-B8FC-AC1667EBCBE1}">
+              <a14:hiddenEffects xmlns:a14="http://schemas.microsoft.com/office/drawing/2010/main">
+                <a:effectLst>
+                  <a:outerShdw dist="35921" dir="2700000" algn="ctr" rotWithShape="0">
+                    <a:schemeClr val="bg2"/>
+                  </a:outerShdw>
+                </a:effectLst>
+              </a14:hiddenEffects>
+            </a:ext>
+          </a:extLst>
+        </p:spPr>
+        <p:txBody>
+          <a:bodyPr vert="horz" wrap="square" lIns="91440" tIns="45720" rIns="91440" bIns="45720" numCol="1" anchor="ctr" anchorCtr="0" compatLnSpc="1">
+            <a:prstTxWarp prst="textNoShape">
+              <a:avLst/>
+            </a:prstTxWarp>
+            <a:spAutoFit/>
+          </a:bodyPr>
+          <a:lstStyle/>
+          <a:p>
+            <a:pPr marL="0" marR="0" lvl="0" indent="0" algn="l" defTabSz="914400" rtl="0" eaLnBrk="0" fontAlgn="base" latinLnBrk="0" hangingPunct="0">
+              <a:lnSpc>
+                <a:spcPct val="150000"/>
+              </a:lnSpc>
+              <a:spcBef>
+                <a:spcPct val="0"/>
+              </a:spcBef>
+              <a:spcAft>
+                <a:spcPct val="0"/>
+              </a:spcAft>
+              <a:buClrTx/>
+              <a:buSzTx/>
+              <a:buFontTx/>
+              <a:buChar char="•"/>
+              <a:tabLst/>
+            </a:pPr>
+            <a:r>
+              <a:rPr kumimoji="0" lang="en-US" altLang="en-US" sz="2000" b="1" i="0" u="none" strike="noStrike" cap="none" normalizeH="0" baseline="0" dirty="0">
+                <a:ln>
+                  <a:noFill/>
+                </a:ln>
+                <a:solidFill>
+                  <a:schemeClr val="tx1"/>
+                </a:solidFill>
+                <a:effectLst/>
+                <a:latin typeface="Arial" panose="020B0604020202020204" pitchFamily="34" charset="0"/>
+              </a:rPr>
+              <a:t>nnFormer Encoder Implementation:</a:t>
+            </a:r>
+            <a:endParaRPr kumimoji="0" lang="en-US" altLang="en-US" sz="2000" b="0" i="0" u="none" strike="noStrike" cap="none" normalizeH="0" baseline="0" dirty="0">
+              <a:ln>
+                <a:noFill/>
+              </a:ln>
+              <a:solidFill>
+                <a:schemeClr val="tx1"/>
+              </a:solidFill>
+              <a:effectLst/>
+              <a:latin typeface="Arial" panose="020B0604020202020204" pitchFamily="34" charset="0"/>
+            </a:endParaRPr>
+          </a:p>
+          <a:p>
+            <a:pPr marL="0" marR="0" lvl="0" indent="0" algn="l" defTabSz="914400" rtl="0" eaLnBrk="0" fontAlgn="base" latinLnBrk="0" hangingPunct="0">
+              <a:lnSpc>
+                <a:spcPct val="150000"/>
+              </a:lnSpc>
+              <a:spcBef>
+                <a:spcPct val="0"/>
+              </a:spcBef>
+              <a:spcAft>
+                <a:spcPct val="0"/>
+              </a:spcAft>
+              <a:buClrTx/>
+              <a:buSzTx/>
+              <a:buFontTx/>
+              <a:buChar char="•"/>
+              <a:tabLst/>
+            </a:pPr>
+            <a:r>
+              <a:rPr kumimoji="0" lang="en-US" altLang="en-US" sz="2000" b="0" i="0" u="none" strike="noStrike" cap="none" normalizeH="0" baseline="0" dirty="0">
+                <a:ln>
+                  <a:noFill/>
+                </a:ln>
+                <a:solidFill>
+                  <a:schemeClr val="tx1"/>
+                </a:solidFill>
+                <a:effectLst/>
+                <a:latin typeface="Arial" panose="020B0604020202020204" pitchFamily="34" charset="0"/>
+              </a:rPr>
+              <a:t>Successfully implemented the encoding part of the nnFormer architecture.</a:t>
+            </a:r>
+          </a:p>
+          <a:p>
+            <a:pPr marL="0" marR="0" lvl="0" indent="0" algn="l" defTabSz="914400" rtl="0" eaLnBrk="0" fontAlgn="base" latinLnBrk="0" hangingPunct="0">
+              <a:lnSpc>
+                <a:spcPct val="150000"/>
+              </a:lnSpc>
+              <a:spcBef>
+                <a:spcPct val="0"/>
+              </a:spcBef>
+              <a:spcAft>
+                <a:spcPct val="0"/>
+              </a:spcAft>
+              <a:buClrTx/>
+              <a:buSzTx/>
+              <a:buFontTx/>
+              <a:buChar char="•"/>
+              <a:tabLst/>
+            </a:pPr>
+            <a:r>
+              <a:rPr kumimoji="0" lang="en-US" altLang="en-US" sz="2000" b="0" i="0" u="none" strike="noStrike" cap="none" normalizeH="0" baseline="0" dirty="0">
+                <a:ln>
+                  <a:noFill/>
+                </a:ln>
+                <a:solidFill>
+                  <a:schemeClr val="tx1"/>
+                </a:solidFill>
+                <a:effectLst/>
+                <a:latin typeface="Arial" panose="020B0604020202020204" pitchFamily="34" charset="0"/>
+              </a:rPr>
+              <a:t>Encoder processes the input data, extracting essential features.</a:t>
+            </a:r>
+          </a:p>
+          <a:p>
+            <a:pPr marL="0" marR="0" lvl="0" indent="0" algn="l" defTabSz="914400" rtl="0" eaLnBrk="0" fontAlgn="base" latinLnBrk="0" hangingPunct="0">
+              <a:lnSpc>
+                <a:spcPct val="150000"/>
+              </a:lnSpc>
+              <a:spcBef>
+                <a:spcPct val="0"/>
+              </a:spcBef>
+              <a:spcAft>
+                <a:spcPct val="0"/>
+              </a:spcAft>
+              <a:buClrTx/>
+              <a:buSzTx/>
+              <a:buFontTx/>
+              <a:buChar char="•"/>
+              <a:tabLst/>
+            </a:pPr>
+            <a:r>
+              <a:rPr kumimoji="0" lang="en-US" altLang="en-US" sz="2000" b="1" i="0" u="none" strike="noStrike" cap="none" normalizeH="0" baseline="0" dirty="0">
+                <a:ln>
+                  <a:noFill/>
+                </a:ln>
+                <a:solidFill>
+                  <a:schemeClr val="tx1"/>
+                </a:solidFill>
+                <a:effectLst/>
+                <a:latin typeface="Arial" panose="020B0604020202020204" pitchFamily="34" charset="0"/>
+              </a:rPr>
+              <a:t>Patch Preparation:</a:t>
+            </a:r>
+            <a:endParaRPr kumimoji="0" lang="en-US" altLang="en-US" sz="2000" b="0" i="0" u="none" strike="noStrike" cap="none" normalizeH="0" baseline="0" dirty="0">
+              <a:ln>
+                <a:noFill/>
+              </a:ln>
+              <a:solidFill>
+                <a:schemeClr val="tx1"/>
+              </a:solidFill>
+              <a:effectLst/>
+              <a:latin typeface="Arial" panose="020B0604020202020204" pitchFamily="34" charset="0"/>
+            </a:endParaRPr>
+          </a:p>
+          <a:p>
+            <a:pPr marL="0" marR="0" lvl="0" indent="0" algn="l" defTabSz="914400" rtl="0" eaLnBrk="0" fontAlgn="base" latinLnBrk="0" hangingPunct="0">
+              <a:lnSpc>
+                <a:spcPct val="150000"/>
+              </a:lnSpc>
+              <a:spcBef>
+                <a:spcPct val="0"/>
+              </a:spcBef>
+              <a:spcAft>
+                <a:spcPct val="0"/>
+              </a:spcAft>
+              <a:buClrTx/>
+              <a:buSzTx/>
+              <a:buFontTx/>
+              <a:buChar char="•"/>
+              <a:tabLst/>
+            </a:pPr>
+            <a:r>
+              <a:rPr kumimoji="0" lang="en-US" altLang="en-US" sz="2000" b="0" i="0" u="none" strike="noStrike" cap="none" normalizeH="0" baseline="0" dirty="0">
+                <a:ln>
+                  <a:noFill/>
+                </a:ln>
+                <a:solidFill>
+                  <a:schemeClr val="tx1"/>
+                </a:solidFill>
+                <a:effectLst/>
+                <a:latin typeface="Arial" panose="020B0604020202020204" pitchFamily="34" charset="0"/>
+              </a:rPr>
+              <a:t>3D CT images have been converted into 2D patches.</a:t>
+            </a:r>
+          </a:p>
+          <a:p>
+            <a:pPr marL="0" marR="0" lvl="0" indent="0" algn="l" defTabSz="914400" rtl="0" eaLnBrk="0" fontAlgn="base" latinLnBrk="0" hangingPunct="0">
+              <a:lnSpc>
+                <a:spcPct val="150000"/>
+              </a:lnSpc>
+              <a:spcBef>
+                <a:spcPct val="0"/>
+              </a:spcBef>
+              <a:spcAft>
+                <a:spcPct val="0"/>
+              </a:spcAft>
+              <a:buClrTx/>
+              <a:buSzTx/>
+              <a:buFontTx/>
+              <a:buChar char="•"/>
+              <a:tabLst/>
+            </a:pPr>
+            <a:r>
+              <a:rPr kumimoji="0" lang="en-US" altLang="en-US" sz="2000" b="0" i="0" u="none" strike="noStrike" cap="none" normalizeH="0" baseline="0" dirty="0">
+                <a:ln>
+                  <a:noFill/>
+                </a:ln>
+                <a:solidFill>
+                  <a:schemeClr val="tx1"/>
+                </a:solidFill>
+                <a:effectLst/>
+                <a:latin typeface="Arial" panose="020B0604020202020204" pitchFamily="34" charset="0"/>
+              </a:rPr>
+              <a:t>Patches are ready for feeding into the nnFormer model.</a:t>
+            </a:r>
+          </a:p>
+          <a:p>
+            <a:pPr marL="0" marR="0" lvl="0" indent="0" algn="l" defTabSz="914400" rtl="0" eaLnBrk="0" fontAlgn="base" latinLnBrk="0" hangingPunct="0">
+              <a:lnSpc>
+                <a:spcPct val="150000"/>
+              </a:lnSpc>
+              <a:spcBef>
+                <a:spcPct val="0"/>
+              </a:spcBef>
+              <a:spcAft>
+                <a:spcPct val="0"/>
+              </a:spcAft>
+              <a:buClrTx/>
+              <a:buSzTx/>
+              <a:buFontTx/>
+              <a:buNone/>
+              <a:tabLst/>
+            </a:pPr>
+            <a:endParaRPr kumimoji="0" lang="en-US" altLang="en-US" sz="1800" b="0" i="0" u="none" strike="noStrike" cap="none" normalizeH="0" baseline="0" dirty="0">
+              <a:ln>
+                <a:noFill/>
+              </a:ln>
+              <a:solidFill>
+                <a:schemeClr val="tx1"/>
+              </a:solidFill>
+              <a:effectLst/>
+              <a:latin typeface="Arial" panose="020B0604020202020204" pitchFamily="34" charset="0"/>
+            </a:endParaRPr>
+          </a:p>
+        </p:txBody>
+      </p:sp>
     </p:spTree>
+    <p:extLst>
+      <p:ext uri="{BB962C8B-B14F-4D97-AF65-F5344CB8AC3E}">
+        <p14:creationId xmlns:p14="http://schemas.microsoft.com/office/powerpoint/2010/main" val="3792525751"/>
+      </p:ext>
+    </p:extLst>
   </p:cSld>
   <p:clrMapOvr>
     <a:masterClrMapping/>
@@ -5089,21 +6722,21 @@
                 <a:latin typeface="Times New Roman" panose="02020603050405020304" pitchFamily="18" charset="0"/>
                 <a:cs typeface="Times New Roman" panose="02020603050405020304" pitchFamily="18" charset="0"/>
               </a:rPr>
-              <a:t>Details of 1</a:t>
+              <a:t>Details of 2</a:t>
             </a:r>
             <a:r>
               <a:rPr lang="en-US" baseline="30000" dirty="0">
                 <a:latin typeface="Times New Roman" panose="02020603050405020304" pitchFamily="18" charset="0"/>
                 <a:cs typeface="Times New Roman" panose="02020603050405020304" pitchFamily="18" charset="0"/>
               </a:rPr>
-              <a:t>st</a:t>
+              <a:t>nd</a:t>
             </a:r>
             <a:r>
               <a:rPr lang="en-US" dirty="0">
                 <a:latin typeface="Times New Roman" panose="02020603050405020304" pitchFamily="18" charset="0"/>
                 <a:cs typeface="Times New Roman" panose="02020603050405020304" pitchFamily="18" charset="0"/>
               </a:rPr>
-              <a:t> Iteration (30%)</a:t>
+              <a:t> Iteration (60%)</a:t>
             </a:r>
           </a:p>
         </p:txBody>
@@ -5123,18 +6756,42 @@
           <a:bodyPr/>
           <a:lstStyle/>
           <a:p>
-            <a:r>
-              <a:rPr lang="en-US" i="1" dirty="0">
-                <a:solidFill>
-                  <a:schemeClr val="bg1">
-                    <a:lumMod val="75000"/>
-                  </a:schemeClr>
-                </a:solidFill>
-                <a:latin typeface="Times New Roman" panose="02020603050405020304" pitchFamily="18" charset="0"/>
-                <a:cs typeface="Times New Roman" panose="02020603050405020304" pitchFamily="18" charset="0"/>
-              </a:rPr>
-              <a:t>What was completed as per Gantt Chart in 30%</a:t>
-            </a:r>
+            <a:pPr>
+              <a:buFont typeface="Arial" panose="020B0604020202020204" pitchFamily="34" charset="0"/>
+              <a:buChar char="•"/>
+            </a:pPr>
+            <a:r>
+              <a:rPr lang="en-US" b="1" dirty="0"/>
+              <a:t>Model Training: </a:t>
+            </a:r>
+            <a:r>
+              <a:rPr lang="en-US" dirty="0"/>
+              <a:t>Train the nnFormer model on prepared patches for liver tumor segmentation.</a:t>
+            </a:r>
+          </a:p>
+          <a:p>
+            <a:pPr>
+              <a:buFont typeface="Arial" panose="020B0604020202020204" pitchFamily="34" charset="0"/>
+              <a:buChar char="•"/>
+            </a:pPr>
+            <a:r>
+              <a:rPr lang="en-US" dirty="0"/>
+              <a:t>Evaluate performance and fine-tune the model.</a:t>
+            </a:r>
+          </a:p>
+          <a:p>
+            <a:pPr marL="0" indent="0">
+              <a:buNone/>
+            </a:pPr>
+            <a:endParaRPr lang="en-US" i="1" dirty="0">
+              <a:solidFill>
+                <a:schemeClr val="bg1">
+                  <a:lumMod val="75000"/>
+                </a:schemeClr>
+              </a:solidFill>
+              <a:latin typeface="Times New Roman" panose="02020603050405020304" pitchFamily="18" charset="0"/>
+              <a:cs typeface="Times New Roman" panose="02020603050405020304" pitchFamily="18" charset="0"/>
+            </a:endParaRPr>
           </a:p>
         </p:txBody>
       </p:sp>
@@ -5213,26 +6870,13 @@
           <a:bodyPr/>
           <a:lstStyle/>
           <a:p>
+            <a:pPr algn="l"/>
             <a:r>
               <a:rPr lang="en-US" dirty="0">
                 <a:latin typeface="Times New Roman" panose="02020603050405020304" pitchFamily="18" charset="0"/>
                 <a:cs typeface="Times New Roman" panose="02020603050405020304" pitchFamily="18" charset="0"/>
               </a:rPr>
-              <a:t>Details of 2</a:t>
-            </a:r>
-            <a:r>
-              <a:rPr lang="en-US" baseline="30000" dirty="0">
-                <a:latin typeface="Times New Roman" panose="02020603050405020304" pitchFamily="18" charset="0"/>
-                <a:cs typeface="Times New Roman" panose="02020603050405020304" pitchFamily="18" charset="0"/>
-              </a:rPr>
-              <a:t>nd</a:t>
-            </a:r>
-            <a:r>
-              <a:rPr lang="en-US" dirty="0">
-                <a:latin typeface="Times New Roman" panose="02020603050405020304" pitchFamily="18" charset="0"/>
-                <a:cs typeface="Times New Roman" panose="02020603050405020304" pitchFamily="18" charset="0"/>
-              </a:rPr>
-              <a:t> Iteration (60%)</a:t>
+              <a:t>Conclusion</a:t>
             </a:r>
           </a:p>
         </p:txBody>
@@ -5249,21 +6893,37 @@
         </p:nvSpPr>
         <p:spPr/>
         <p:txBody>
-          <a:bodyPr/>
-          <a:lstStyle/>
-          <a:p>
-            <a:r>
-              <a:rPr lang="en-US" i="1" dirty="0">
-                <a:solidFill>
-                  <a:schemeClr val="bg1">
-                    <a:lumMod val="75000"/>
-                  </a:schemeClr>
-                </a:solidFill>
-                <a:latin typeface="Times New Roman" panose="02020603050405020304" pitchFamily="18" charset="0"/>
-                <a:cs typeface="Times New Roman" panose="02020603050405020304" pitchFamily="18" charset="0"/>
-              </a:rPr>
-              <a:t>What will completed as per Gantt Chart in 60%</a:t>
-            </a:r>
+          <a:bodyPr>
+            <a:normAutofit fontScale="85000" lnSpcReduction="10000"/>
+          </a:bodyPr>
+          <a:lstStyle/>
+          <a:p>
+            <a:pPr marL="0" indent="0">
+              <a:buNone/>
+            </a:pPr>
+            <a:r>
+              <a:rPr lang="en-US" dirty="0"/>
+              <a:t>So far, we have completed the initial stages of the project, including the implementation of the encoder part of the nnFormer architecture. Additionally, we have prepared and processed the 2D patches from 3D CT images, making them ready for feeding into the nnFormer model.</a:t>
+            </a:r>
+          </a:p>
+          <a:p>
+            <a:pPr marL="0" indent="0">
+              <a:buNone/>
+            </a:pPr>
+            <a:endParaRPr lang="en-US" dirty="0"/>
+          </a:p>
+          <a:p>
+            <a:pPr marL="0" indent="0">
+              <a:buNone/>
+            </a:pPr>
+            <a:r>
+              <a:rPr lang="en-US" dirty="0"/>
+              <a:t> This forms the foundation for the next steps in the project, where we will focus on training the model and evaluating its performance. These early achievements have set the stage for building a robust liver tumor segmentation system.</a:t>
+            </a:r>
+            <a:endParaRPr lang="en-US" dirty="0">
+              <a:latin typeface="Times New Roman" panose="02020603050405020304" pitchFamily="18" charset="0"/>
+              <a:cs typeface="Times New Roman" panose="02020603050405020304" pitchFamily="18" charset="0"/>
+            </a:endParaRPr>
           </a:p>
         </p:txBody>
       </p:sp>
@@ -5289,114 +6949,6 @@
               </a:rPr>
               <a:pPr/>
               <a:t>17</a:t>
-            </a:fld>
-            <a:endParaRPr lang="en-US">
-              <a:latin typeface="Times New Roman" panose="02020603050405020304" pitchFamily="18" charset="0"/>
-              <a:cs typeface="Times New Roman" panose="02020603050405020304" pitchFamily="18" charset="0"/>
-            </a:endParaRPr>
-          </a:p>
-        </p:txBody>
-      </p:sp>
-    </p:spTree>
-    <p:extLst>
-      <p:ext uri="{BB962C8B-B14F-4D97-AF65-F5344CB8AC3E}">
-        <p14:creationId xmlns:p14="http://schemas.microsoft.com/office/powerpoint/2010/main" val="3792525751"/>
-      </p:ext>
-    </p:extLst>
-  </p:cSld>
-  <p:clrMapOvr>
-    <a:masterClrMapping/>
-  </p:clrMapOvr>
-</p:sld>
-</file>
-
-<file path=ppt/slides/slide18.xml><?xml version="1.0" encoding="utf-8"?>
-<p:sld xmlns:a="http://schemas.openxmlformats.org/drawingml/2006/main" xmlns:r="http://schemas.openxmlformats.org/officeDocument/2006/relationships" xmlns:p="http://schemas.openxmlformats.org/presentationml/2006/main">
-  <p:cSld>
-    <p:spTree>
-      <p:nvGrpSpPr>
-        <p:cNvPr id="1" name=""/>
-        <p:cNvGrpSpPr/>
-        <p:nvPr/>
-      </p:nvGrpSpPr>
-      <p:grpSpPr>
-        <a:xfrm>
-          <a:off x="0" y="0"/>
-          <a:ext cx="0" cy="0"/>
-          <a:chOff x="0" y="0"/>
-          <a:chExt cx="0" cy="0"/>
-        </a:xfrm>
-      </p:grpSpPr>
-      <p:sp>
-        <p:nvSpPr>
-          <p:cNvPr id="2" name="Title 1"/>
-          <p:cNvSpPr>
-            <a:spLocks noGrp="1"/>
-          </p:cNvSpPr>
-          <p:nvPr>
-            <p:ph type="title"/>
-          </p:nvPr>
-        </p:nvSpPr>
-        <p:spPr/>
-        <p:txBody>
-          <a:bodyPr/>
-          <a:lstStyle/>
-          <a:p>
-            <a:pPr algn="l"/>
-            <a:r>
-              <a:rPr lang="en-US" dirty="0">
-                <a:latin typeface="Times New Roman" panose="02020603050405020304" pitchFamily="18" charset="0"/>
-                <a:cs typeface="Times New Roman" panose="02020603050405020304" pitchFamily="18" charset="0"/>
-              </a:rPr>
-              <a:t>Conclusion</a:t>
-            </a:r>
-          </a:p>
-        </p:txBody>
-      </p:sp>
-      <p:sp>
-        <p:nvSpPr>
-          <p:cNvPr id="3" name="Content Placeholder 2"/>
-          <p:cNvSpPr>
-            <a:spLocks noGrp="1"/>
-          </p:cNvSpPr>
-          <p:nvPr>
-            <p:ph idx="1"/>
-          </p:nvPr>
-        </p:nvSpPr>
-        <p:spPr/>
-        <p:txBody>
-          <a:bodyPr/>
-          <a:lstStyle/>
-          <a:p>
-            <a:endParaRPr lang="en-US" dirty="0">
-              <a:latin typeface="Times New Roman" panose="02020603050405020304" pitchFamily="18" charset="0"/>
-              <a:cs typeface="Times New Roman" panose="02020603050405020304" pitchFamily="18" charset="0"/>
-            </a:endParaRPr>
-          </a:p>
-        </p:txBody>
-      </p:sp>
-      <p:sp>
-        <p:nvSpPr>
-          <p:cNvPr id="4" name="Slide Number Placeholder 3"/>
-          <p:cNvSpPr>
-            <a:spLocks noGrp="1"/>
-          </p:cNvSpPr>
-          <p:nvPr>
-            <p:ph type="sldNum" sz="quarter" idx="12"/>
-          </p:nvPr>
-        </p:nvSpPr>
-        <p:spPr/>
-        <p:txBody>
-          <a:bodyPr/>
-          <a:lstStyle/>
-          <a:p>
-            <a:fld id="{DC2A8C5E-5ACC-4DAB-B41C-5718F8C58B6D}" type="slidenum">
-              <a:rPr lang="en-US" smtClean="0">
-                <a:latin typeface="Times New Roman" panose="02020603050405020304" pitchFamily="18" charset="0"/>
-                <a:cs typeface="Times New Roman" panose="02020603050405020304" pitchFamily="18" charset="0"/>
-              </a:rPr>
-              <a:pPr/>
-              <a:t>18</a:t>
             </a:fld>
             <a:endParaRPr lang="en-US">
               <a:latin typeface="Times New Roman" panose="02020603050405020304" pitchFamily="18" charset="0"/>

</xml_diff>